<commit_message>
inseri quase tudo o que tínhamos no relat
</commit_message>
<xml_diff>
--- a/Etapa1/Apresentação1fase.pptx
+++ b/Etapa1/Apresentação1fase.pptx
@@ -5,21 +5,23 @@
     <p:sldMasterId id="2147483786" r:id="rId1"/>
   </p:sldMasterIdLst>
   <p:notesMasterIdLst>
-    <p:notesMasterId r:id="rId14"/>
+    <p:notesMasterId r:id="rId16"/>
   </p:notesMasterIdLst>
   <p:sldIdLst>
     <p:sldId id="256" r:id="rId2"/>
     <p:sldId id="257" r:id="rId3"/>
     <p:sldId id="258" r:id="rId4"/>
-    <p:sldId id="260" r:id="rId5"/>
-    <p:sldId id="261" r:id="rId6"/>
-    <p:sldId id="262" r:id="rId7"/>
-    <p:sldId id="263" r:id="rId8"/>
-    <p:sldId id="264" r:id="rId9"/>
-    <p:sldId id="265" r:id="rId10"/>
-    <p:sldId id="266" r:id="rId11"/>
-    <p:sldId id="259" r:id="rId12"/>
-    <p:sldId id="267" r:id="rId13"/>
+    <p:sldId id="268" r:id="rId5"/>
+    <p:sldId id="269" r:id="rId6"/>
+    <p:sldId id="260" r:id="rId7"/>
+    <p:sldId id="261" r:id="rId8"/>
+    <p:sldId id="262" r:id="rId9"/>
+    <p:sldId id="263" r:id="rId10"/>
+    <p:sldId id="264" r:id="rId11"/>
+    <p:sldId id="265" r:id="rId12"/>
+    <p:sldId id="266" r:id="rId13"/>
+    <p:sldId id="259" r:id="rId14"/>
+    <p:sldId id="267" r:id="rId15"/>
   </p:sldIdLst>
   <p:sldSz cx="12192000" cy="6858000"/>
   <p:notesSz cx="6858000" cy="9144000"/>
@@ -118,6 +120,11 @@
       </a:defRPr>
     </a:lvl9pPr>
   </p:defaultTextStyle>
+  <p:extLst>
+    <p:ext uri="{EFAFB233-063F-42B5-8137-9DF3F51BA10A}">
+      <p15:sldGuideLst xmlns:p15="http://schemas.microsoft.com/office/powerpoint/2012/main"/>
+    </p:ext>
+  </p:extLst>
 </p:presentation>
 </file>
 
@@ -469,6 +476,346 @@
     </a:lvl9pPr>
   </p:notesStyle>
 </p:notesMaster>
+</file>
+
+<file path=ppt/notesSlides/notesSlide1.xml><?xml version="1.0" encoding="utf-8"?>
+<p:notes xmlns:a="http://schemas.openxmlformats.org/drawingml/2006/main" xmlns:r="http://schemas.openxmlformats.org/officeDocument/2006/relationships" xmlns:p="http://schemas.openxmlformats.org/presentationml/2006/main">
+  <p:cSld>
+    <p:spTree>
+      <p:nvGrpSpPr>
+        <p:cNvPr id="1" name=""/>
+        <p:cNvGrpSpPr/>
+        <p:nvPr/>
+      </p:nvGrpSpPr>
+      <p:grpSpPr>
+        <a:xfrm>
+          <a:off x="0" y="0"/>
+          <a:ext cx="0" cy="0"/>
+          <a:chOff x="0" y="0"/>
+          <a:chExt cx="0" cy="0"/>
+        </a:xfrm>
+      </p:grpSpPr>
+      <p:sp>
+        <p:nvSpPr>
+          <p:cNvPr id="2" name="Marcador de Posição da Imagem do Diapositivo 1"/>
+          <p:cNvSpPr>
+            <a:spLocks noGrp="1" noRot="1" noChangeAspect="1"/>
+          </p:cNvSpPr>
+          <p:nvPr>
+            <p:ph type="sldImg"/>
+          </p:nvPr>
+        </p:nvSpPr>
+        <p:spPr/>
+      </p:sp>
+      <p:sp>
+        <p:nvSpPr>
+          <p:cNvPr id="3" name="Marcador de Posição de Notas 2"/>
+          <p:cNvSpPr>
+            <a:spLocks noGrp="1"/>
+          </p:cNvSpPr>
+          <p:nvPr>
+            <p:ph type="body" idx="1"/>
+          </p:nvPr>
+        </p:nvSpPr>
+        <p:spPr/>
+        <p:txBody>
+          <a:bodyPr/>
+          <a:lstStyle/>
+          <a:p>
+            <a:endParaRPr lang="pt-PT" dirty="0"/>
+          </a:p>
+        </p:txBody>
+      </p:sp>
+      <p:sp>
+        <p:nvSpPr>
+          <p:cNvPr id="4" name="Marcador de Posição do Número do Diapositivo 3"/>
+          <p:cNvSpPr>
+            <a:spLocks noGrp="1"/>
+          </p:cNvSpPr>
+          <p:nvPr>
+            <p:ph type="sldNum" sz="quarter" idx="10"/>
+          </p:nvPr>
+        </p:nvSpPr>
+        <p:spPr/>
+        <p:txBody>
+          <a:bodyPr/>
+          <a:lstStyle/>
+          <a:p>
+            <a:fld id="{26C69C62-EB60-974E-84E6-398224DAB941}" type="slidenum">
+              <a:rPr lang="pt-PT" smtClean="0"/>
+              <a:t>1</a:t>
+            </a:fld>
+            <a:endParaRPr lang="pt-PT"/>
+          </a:p>
+        </p:txBody>
+      </p:sp>
+    </p:spTree>
+    <p:extLst>
+      <p:ext uri="{BB962C8B-B14F-4D97-AF65-F5344CB8AC3E}">
+        <p14:creationId xmlns:p14="http://schemas.microsoft.com/office/powerpoint/2010/main" val="1308483143"/>
+      </p:ext>
+    </p:extLst>
+  </p:cSld>
+  <p:clrMapOvr>
+    <a:masterClrMapping/>
+  </p:clrMapOvr>
+</p:notes>
+</file>
+
+<file path=ppt/notesSlides/notesSlide2.xml><?xml version="1.0" encoding="utf-8"?>
+<p:notes xmlns:a="http://schemas.openxmlformats.org/drawingml/2006/main" xmlns:r="http://schemas.openxmlformats.org/officeDocument/2006/relationships" xmlns:p="http://schemas.openxmlformats.org/presentationml/2006/main">
+  <p:cSld>
+    <p:spTree>
+      <p:nvGrpSpPr>
+        <p:cNvPr id="1" name=""/>
+        <p:cNvGrpSpPr/>
+        <p:nvPr/>
+      </p:nvGrpSpPr>
+      <p:grpSpPr>
+        <a:xfrm>
+          <a:off x="0" y="0"/>
+          <a:ext cx="0" cy="0"/>
+          <a:chOff x="0" y="0"/>
+          <a:chExt cx="0" cy="0"/>
+        </a:xfrm>
+      </p:grpSpPr>
+      <p:sp>
+        <p:nvSpPr>
+          <p:cNvPr id="2" name="Marcador de Posição da Imagem do Diapositivo 1"/>
+          <p:cNvSpPr>
+            <a:spLocks noGrp="1" noRot="1" noChangeAspect="1"/>
+          </p:cNvSpPr>
+          <p:nvPr>
+            <p:ph type="sldImg"/>
+          </p:nvPr>
+        </p:nvSpPr>
+        <p:spPr/>
+      </p:sp>
+      <p:sp>
+        <p:nvSpPr>
+          <p:cNvPr id="3" name="Marcador de Posição de Notas 2"/>
+          <p:cNvSpPr>
+            <a:spLocks noGrp="1"/>
+          </p:cNvSpPr>
+          <p:nvPr>
+            <p:ph type="body" idx="1"/>
+          </p:nvPr>
+        </p:nvSpPr>
+        <p:spPr/>
+        <p:txBody>
+          <a:bodyPr/>
+          <a:lstStyle/>
+          <a:p>
+            <a:r>
+              <a:rPr lang="pt-PT" dirty="0" smtClean="0"/>
+              <a:t>Por exemplo pode ordenar pelo preço do produto, pela distância a que se encontram os estabelecimentos em que exista o produto que deseja e pode também estabelecer ordem pelo </a:t>
+            </a:r>
+            <a:r>
+              <a:rPr lang="pt-PT" i="1" dirty="0" smtClean="0"/>
+              <a:t>rating</a:t>
+            </a:r>
+            <a:r>
+              <a:rPr lang="pt-PT" dirty="0" smtClean="0"/>
+              <a:t> dos estabelecimentos em que exista o produto.</a:t>
+            </a:r>
+          </a:p>
+          <a:p>
+            <a:r>
+              <a:rPr lang="pt-PT" dirty="0" smtClean="0"/>
+              <a:t> O utilizador poderá classificar o estabelecimento sugerido pela aplicação assim como o produto que vai degustar nesse mesmo estabelecimento.  A autenticação na </a:t>
+            </a:r>
+            <a:r>
+              <a:rPr lang="pt-PT" i="1" dirty="0" err="1" smtClean="0"/>
+              <a:t>app</a:t>
+            </a:r>
+            <a:r>
+              <a:rPr lang="pt-PT" dirty="0" smtClean="0"/>
+              <a:t> é facultativa, contudo caso um utilizador deseje guardar o seu histórico de procuras assim como as suas preferências deverá registar-se na aplicação. </a:t>
+            </a:r>
+          </a:p>
+          <a:p>
+            <a:endParaRPr lang="pt-PT" dirty="0"/>
+          </a:p>
+        </p:txBody>
+      </p:sp>
+      <p:sp>
+        <p:nvSpPr>
+          <p:cNvPr id="4" name="Marcador de Posição do Número do Diapositivo 3"/>
+          <p:cNvSpPr>
+            <a:spLocks noGrp="1"/>
+          </p:cNvSpPr>
+          <p:nvPr>
+            <p:ph type="sldNum" sz="quarter" idx="10"/>
+          </p:nvPr>
+        </p:nvSpPr>
+        <p:spPr/>
+        <p:txBody>
+          <a:bodyPr/>
+          <a:lstStyle/>
+          <a:p>
+            <a:fld id="{26C69C62-EB60-974E-84E6-398224DAB941}" type="slidenum">
+              <a:rPr lang="pt-PT" smtClean="0"/>
+              <a:t>9</a:t>
+            </a:fld>
+            <a:endParaRPr lang="pt-PT"/>
+          </a:p>
+        </p:txBody>
+      </p:sp>
+    </p:spTree>
+    <p:extLst>
+      <p:ext uri="{BB962C8B-B14F-4D97-AF65-F5344CB8AC3E}">
+        <p14:creationId xmlns:p14="http://schemas.microsoft.com/office/powerpoint/2010/main" val="2141543043"/>
+      </p:ext>
+    </p:extLst>
+  </p:cSld>
+  <p:clrMapOvr>
+    <a:masterClrMapping/>
+  </p:clrMapOvr>
+</p:notes>
+</file>
+
+<file path=ppt/notesSlides/notesSlide3.xml><?xml version="1.0" encoding="utf-8"?>
+<p:notes xmlns:a="http://schemas.openxmlformats.org/drawingml/2006/main" xmlns:r="http://schemas.openxmlformats.org/officeDocument/2006/relationships" xmlns:p="http://schemas.openxmlformats.org/presentationml/2006/main">
+  <p:cSld>
+    <p:spTree>
+      <p:nvGrpSpPr>
+        <p:cNvPr id="1" name=""/>
+        <p:cNvGrpSpPr/>
+        <p:nvPr/>
+      </p:nvGrpSpPr>
+      <p:grpSpPr>
+        <a:xfrm>
+          <a:off x="0" y="0"/>
+          <a:ext cx="0" cy="0"/>
+          <a:chOff x="0" y="0"/>
+          <a:chExt cx="0" cy="0"/>
+        </a:xfrm>
+      </p:grpSpPr>
+      <p:sp>
+        <p:nvSpPr>
+          <p:cNvPr id="2" name="Marcador de Posição da Imagem do Diapositivo 1"/>
+          <p:cNvSpPr>
+            <a:spLocks noGrp="1" noRot="1" noChangeAspect="1"/>
+          </p:cNvSpPr>
+          <p:nvPr>
+            <p:ph type="sldImg"/>
+          </p:nvPr>
+        </p:nvSpPr>
+        <p:spPr/>
+      </p:sp>
+      <p:sp>
+        <p:nvSpPr>
+          <p:cNvPr id="3" name="Marcador de Posição de Notas 2"/>
+          <p:cNvSpPr>
+            <a:spLocks noGrp="1"/>
+          </p:cNvSpPr>
+          <p:nvPr>
+            <p:ph type="body" idx="1"/>
+          </p:nvPr>
+        </p:nvSpPr>
+        <p:spPr/>
+        <p:txBody>
+          <a:bodyPr/>
+          <a:lstStyle/>
+          <a:p>
+            <a:r>
+              <a:rPr lang="pt-PT" sz="1200" kern="1200" dirty="0" smtClean="0">
+                <a:solidFill>
+                  <a:schemeClr val="tx1"/>
+                </a:solidFill>
+                <a:effectLst/>
+                <a:latin typeface="+mn-lt"/>
+                <a:ea typeface="+mn-ea"/>
+                <a:cs typeface="+mn-cs"/>
+              </a:rPr>
+              <a:t>De forma a tornar o desenvolvimento do nosso projeto mais organizado e a fornecer dados como o tempo disponibilizado </a:t>
+            </a:r>
+            <a:r>
+              <a:rPr lang="pt-PT" sz="1200" kern="1200" baseline="0" dirty="0" smtClean="0">
+                <a:solidFill>
+                  <a:schemeClr val="tx1"/>
+                </a:solidFill>
+                <a:effectLst/>
+                <a:latin typeface="+mn-lt"/>
+                <a:ea typeface="+mn-ea"/>
+                <a:cs typeface="+mn-cs"/>
+              </a:rPr>
+              <a:t> à </a:t>
+            </a:r>
+            <a:r>
+              <a:rPr lang="pt-PT" sz="1200" kern="1200" dirty="0" smtClean="0">
+                <a:solidFill>
+                  <a:schemeClr val="tx1"/>
+                </a:solidFill>
+                <a:effectLst/>
+                <a:latin typeface="+mn-lt"/>
+                <a:ea typeface="+mn-ea"/>
+                <a:cs typeface="+mn-cs"/>
+              </a:rPr>
+              <a:t>realização de cada fase, elaboramos com a ajuda da ferramenta Microsoft Project um Diagrama de </a:t>
+            </a:r>
+            <a:r>
+              <a:rPr lang="pt-PT" sz="1200" kern="1200" dirty="0" err="1" smtClean="0">
+                <a:solidFill>
+                  <a:schemeClr val="tx1"/>
+                </a:solidFill>
+                <a:effectLst/>
+                <a:latin typeface="+mn-lt"/>
+                <a:ea typeface="+mn-ea"/>
+                <a:cs typeface="+mn-cs"/>
+              </a:rPr>
+              <a:t>Gantt</a:t>
+            </a:r>
+            <a:r>
+              <a:rPr lang="pt-PT" sz="1200" kern="1200" dirty="0" smtClean="0">
+                <a:solidFill>
+                  <a:schemeClr val="tx1"/>
+                </a:solidFill>
+                <a:effectLst/>
+                <a:latin typeface="+mn-lt"/>
+                <a:ea typeface="+mn-ea"/>
+                <a:cs typeface="+mn-cs"/>
+              </a:rPr>
+              <a:t>. </a:t>
+            </a:r>
+            <a:endParaRPr lang="pt-PT" dirty="0"/>
+          </a:p>
+        </p:txBody>
+      </p:sp>
+      <p:sp>
+        <p:nvSpPr>
+          <p:cNvPr id="4" name="Marcador de Posição do Número do Diapositivo 3"/>
+          <p:cNvSpPr>
+            <a:spLocks noGrp="1"/>
+          </p:cNvSpPr>
+          <p:nvPr>
+            <p:ph type="sldNum" sz="quarter" idx="10"/>
+          </p:nvPr>
+        </p:nvSpPr>
+        <p:spPr/>
+        <p:txBody>
+          <a:bodyPr/>
+          <a:lstStyle/>
+          <a:p>
+            <a:fld id="{26C69C62-EB60-974E-84E6-398224DAB941}" type="slidenum">
+              <a:rPr lang="pt-PT" smtClean="0"/>
+              <a:t>12</a:t>
+            </a:fld>
+            <a:endParaRPr lang="pt-PT"/>
+          </a:p>
+        </p:txBody>
+      </p:sp>
+    </p:spTree>
+    <p:extLst>
+      <p:ext uri="{BB962C8B-B14F-4D97-AF65-F5344CB8AC3E}">
+        <p14:creationId xmlns:p14="http://schemas.microsoft.com/office/powerpoint/2010/main" val="2070841733"/>
+      </p:ext>
+    </p:extLst>
+  </p:cSld>
+  <p:clrMapOvr>
+    <a:masterClrMapping/>
+  </p:clrMapOvr>
+</p:notes>
 </file>
 
 <file path=ppt/slideLayouts/slideLayout1.xml><?xml version="1.0" encoding="utf-8"?>
@@ -4184,7 +4531,7 @@
           <p:nvPr/>
         </p:nvPicPr>
         <p:blipFill>
-          <a:blip r:embed="rId2"/>
+          <a:blip r:embed="rId3"/>
           <a:stretch>
             <a:fillRect/>
           </a:stretch>
@@ -4365,6 +4712,402 @@
       </p:grpSpPr>
       <p:sp>
         <p:nvSpPr>
+          <p:cNvPr id="1029" name="Rectangle 1028"/>
+          <p:cNvSpPr>
+            <a:spLocks noGrp="1" noRot="1" noChangeAspect="1" noMove="1" noResize="1" noEditPoints="1" noAdjustHandles="1" noChangeArrowheads="1" noChangeShapeType="1" noTextEdit="1"/>
+          </p:cNvSpPr>
+          <p:nvPr>
+            <p:extLst>
+              <p:ext uri="{386F3935-93C4-4BCD-93E2-E3B085C9AB24}">
+                <p16:designElem xmlns:p16="http://schemas.microsoft.com/office/powerpoint/2015/main" val="1"/>
+              </p:ext>
+            </p:extLst>
+          </p:nvPr>
+        </p:nvSpPr>
+        <p:spPr bwMode="white">
+          <a:xfrm>
+            <a:off x="0" y="0"/>
+            <a:ext cx="12192000" cy="6858000"/>
+          </a:xfrm>
+          <a:prstGeom prst="rect">
+            <a:avLst/>
+          </a:prstGeom>
+          <a:solidFill>
+            <a:schemeClr val="bg1"/>
+          </a:solidFill>
+          <a:ln>
+            <a:noFill/>
+          </a:ln>
+          <a:effectLst/>
+        </p:spPr>
+      </p:sp>
+      <p:sp>
+        <p:nvSpPr>
+          <p:cNvPr id="71" name="Rectangle 70"/>
+          <p:cNvSpPr>
+            <a:spLocks noGrp="1" noRot="1" noChangeAspect="1" noMove="1" noResize="1" noEditPoints="1" noAdjustHandles="1" noChangeArrowheads="1" noChangeShapeType="1" noTextEdit="1"/>
+          </p:cNvSpPr>
+          <p:nvPr>
+            <p:extLst>
+              <p:ext uri="{386F3935-93C4-4BCD-93E2-E3B085C9AB24}">
+                <p16:designElem xmlns:p16="http://schemas.microsoft.com/office/powerpoint/2015/main" val="1"/>
+              </p:ext>
+            </p:extLst>
+          </p:nvPr>
+        </p:nvSpPr>
+        <p:spPr>
+          <a:xfrm>
+            <a:off x="3175" y="6400800"/>
+            <a:ext cx="12188825" cy="457200"/>
+          </a:xfrm>
+          <a:prstGeom prst="rect">
+            <a:avLst/>
+          </a:prstGeom>
+          <a:solidFill>
+            <a:schemeClr val="accent2"/>
+          </a:solidFill>
+          <a:ln>
+            <a:noFill/>
+          </a:ln>
+        </p:spPr>
+        <p:style>
+          <a:lnRef idx="2">
+            <a:schemeClr val="accent1">
+              <a:shade val="50000"/>
+            </a:schemeClr>
+          </a:lnRef>
+          <a:fillRef idx="1">
+            <a:schemeClr val="accent1"/>
+          </a:fillRef>
+          <a:effectRef idx="0">
+            <a:schemeClr val="accent1"/>
+          </a:effectRef>
+          <a:fontRef idx="minor">
+            <a:schemeClr val="lt1"/>
+          </a:fontRef>
+        </p:style>
+      </p:sp>
+      <p:sp>
+        <p:nvSpPr>
+          <p:cNvPr id="73" name="Rectangle 72"/>
+          <p:cNvSpPr>
+            <a:spLocks noGrp="1" noRot="1" noChangeAspect="1" noMove="1" noResize="1" noEditPoints="1" noAdjustHandles="1" noChangeArrowheads="1" noChangeShapeType="1" noTextEdit="1"/>
+          </p:cNvSpPr>
+          <p:nvPr>
+            <p:extLst>
+              <p:ext uri="{386F3935-93C4-4BCD-93E2-E3B085C9AB24}">
+                <p16:designElem xmlns:p16="http://schemas.microsoft.com/office/powerpoint/2015/main" val="1"/>
+              </p:ext>
+            </p:extLst>
+          </p:nvPr>
+        </p:nvSpPr>
+        <p:spPr>
+          <a:xfrm>
+            <a:off x="15" y="6334316"/>
+            <a:ext cx="12188825" cy="64008"/>
+          </a:xfrm>
+          <a:prstGeom prst="rect">
+            <a:avLst/>
+          </a:prstGeom>
+          <a:solidFill>
+            <a:schemeClr val="accent1"/>
+          </a:solidFill>
+          <a:ln>
+            <a:noFill/>
+          </a:ln>
+        </p:spPr>
+        <p:style>
+          <a:lnRef idx="2">
+            <a:schemeClr val="accent1">
+              <a:shade val="50000"/>
+            </a:schemeClr>
+          </a:lnRef>
+          <a:fillRef idx="1">
+            <a:schemeClr val="accent1"/>
+          </a:fillRef>
+          <a:effectRef idx="0">
+            <a:schemeClr val="accent1"/>
+          </a:effectRef>
+          <a:fontRef idx="minor">
+            <a:schemeClr val="lt1"/>
+          </a:fontRef>
+        </p:style>
+      </p:sp>
+      <p:cxnSp>
+        <p:nvCxnSpPr>
+          <p:cNvPr id="75" name="Straight Connector 74"/>
+          <p:cNvCxnSpPr>
+            <a:cxnSpLocks noGrp="1" noRot="1" noChangeAspect="1" noMove="1" noResize="1" noEditPoints="1" noAdjustHandles="1" noChangeArrowheads="1" noChangeShapeType="1"/>
+          </p:cNvCxnSpPr>
+          <p:nvPr>
+            <p:extLst>
+              <p:ext uri="{386F3935-93C4-4BCD-93E2-E3B085C9AB24}">
+                <p16:designElem xmlns:p16="http://schemas.microsoft.com/office/powerpoint/2015/main" val="1"/>
+              </p:ext>
+            </p:extLst>
+          </p:nvPr>
+        </p:nvCxnSpPr>
+        <p:spPr>
+          <a:xfrm>
+            <a:off x="1207658" y="4343400"/>
+            <a:ext cx="9875520" cy="0"/>
+          </a:xfrm>
+          <a:prstGeom prst="line">
+            <a:avLst/>
+          </a:prstGeom>
+          <a:ln w="6350">
+            <a:solidFill>
+              <a:schemeClr val="tx1">
+                <a:lumMod val="50000"/>
+                <a:lumOff val="50000"/>
+              </a:schemeClr>
+            </a:solidFill>
+          </a:ln>
+        </p:spPr>
+        <p:style>
+          <a:lnRef idx="1">
+            <a:schemeClr val="accent1"/>
+          </a:lnRef>
+          <a:fillRef idx="0">
+            <a:schemeClr val="accent1"/>
+          </a:fillRef>
+          <a:effectRef idx="0">
+            <a:schemeClr val="accent1"/>
+          </a:effectRef>
+          <a:fontRef idx="minor">
+            <a:schemeClr val="tx1"/>
+          </a:fontRef>
+        </p:style>
+      </p:cxnSp>
+      <p:sp useBgFill="1">
+        <p:nvSpPr>
+          <p:cNvPr id="77" name="Rectangle 76"/>
+          <p:cNvSpPr>
+            <a:spLocks noGrp="1" noRot="1" noChangeAspect="1" noMove="1" noResize="1" noEditPoints="1" noAdjustHandles="1" noChangeArrowheads="1" noChangeShapeType="1" noTextEdit="1"/>
+          </p:cNvSpPr>
+          <p:nvPr>
+            <p:extLst>
+              <p:ext uri="{386F3935-93C4-4BCD-93E2-E3B085C9AB24}">
+                <p16:designElem xmlns:p16="http://schemas.microsoft.com/office/powerpoint/2015/main" val="1"/>
+              </p:ext>
+            </p:extLst>
+          </p:nvPr>
+        </p:nvSpPr>
+        <p:spPr>
+          <a:xfrm>
+            <a:off x="0" y="0"/>
+            <a:ext cx="12192001" cy="6334316"/>
+          </a:xfrm>
+          <a:prstGeom prst="rect">
+            <a:avLst/>
+          </a:prstGeom>
+          <a:ln>
+            <a:noFill/>
+          </a:ln>
+        </p:spPr>
+        <p:style>
+          <a:lnRef idx="2">
+            <a:schemeClr val="accent1">
+              <a:shade val="50000"/>
+            </a:schemeClr>
+          </a:lnRef>
+          <a:fillRef idx="1">
+            <a:schemeClr val="accent1"/>
+          </a:fillRef>
+          <a:effectRef idx="0">
+            <a:schemeClr val="accent1"/>
+          </a:effectRef>
+          <a:fontRef idx="minor">
+            <a:schemeClr val="lt1"/>
+          </a:fontRef>
+        </p:style>
+        <p:txBody>
+          <a:bodyPr rtlCol="0" anchor="ctr"/>
+          <a:lstStyle/>
+          <a:p>
+            <a:pPr algn="ctr"/>
+            <a:endParaRPr lang="en-US"/>
+          </a:p>
+        </p:txBody>
+      </p:sp>
+      <p:sp>
+        <p:nvSpPr>
+          <p:cNvPr id="79" name="Rectangle 78"/>
+          <p:cNvSpPr>
+            <a:spLocks noGrp="1" noRot="1" noChangeAspect="1" noMove="1" noResize="1" noEditPoints="1" noAdjustHandles="1" noChangeArrowheads="1" noChangeShapeType="1" noTextEdit="1"/>
+          </p:cNvSpPr>
+          <p:nvPr>
+            <p:extLst>
+              <p:ext uri="{386F3935-93C4-4BCD-93E2-E3B085C9AB24}">
+                <p16:designElem xmlns:p16="http://schemas.microsoft.com/office/powerpoint/2015/main" val="1"/>
+              </p:ext>
+            </p:extLst>
+          </p:nvPr>
+        </p:nvSpPr>
+        <p:spPr>
+          <a:xfrm>
+            <a:off x="1" y="6400800"/>
+            <a:ext cx="12192000" cy="457200"/>
+          </a:xfrm>
+          <a:prstGeom prst="rect">
+            <a:avLst/>
+          </a:prstGeom>
+          <a:solidFill>
+            <a:schemeClr val="accent2"/>
+          </a:solidFill>
+          <a:ln>
+            <a:noFill/>
+          </a:ln>
+        </p:spPr>
+        <p:style>
+          <a:lnRef idx="2">
+            <a:schemeClr val="accent1">
+              <a:shade val="50000"/>
+            </a:schemeClr>
+          </a:lnRef>
+          <a:fillRef idx="1">
+            <a:schemeClr val="accent1"/>
+          </a:fillRef>
+          <a:effectRef idx="0">
+            <a:schemeClr val="accent1"/>
+          </a:effectRef>
+          <a:fontRef idx="minor">
+            <a:schemeClr val="lt1"/>
+          </a:fontRef>
+        </p:style>
+      </p:sp>
+      <p:sp>
+        <p:nvSpPr>
+          <p:cNvPr id="81" name="Rectangle 80"/>
+          <p:cNvSpPr>
+            <a:spLocks noGrp="1" noRot="1" noChangeAspect="1" noMove="1" noResize="1" noEditPoints="1" noAdjustHandles="1" noChangeArrowheads="1" noChangeShapeType="1" noTextEdit="1"/>
+          </p:cNvSpPr>
+          <p:nvPr>
+            <p:extLst>
+              <p:ext uri="{386F3935-93C4-4BCD-93E2-E3B085C9AB24}">
+                <p16:designElem xmlns:p16="http://schemas.microsoft.com/office/powerpoint/2015/main" val="1"/>
+              </p:ext>
+            </p:extLst>
+          </p:nvPr>
+        </p:nvSpPr>
+        <p:spPr>
+          <a:xfrm>
+            <a:off x="15" y="6334316"/>
+            <a:ext cx="12191985" cy="66484"/>
+          </a:xfrm>
+          <a:prstGeom prst="rect">
+            <a:avLst/>
+          </a:prstGeom>
+          <a:solidFill>
+            <a:schemeClr val="accent1"/>
+          </a:solidFill>
+          <a:ln>
+            <a:noFill/>
+          </a:ln>
+        </p:spPr>
+        <p:style>
+          <a:lnRef idx="2">
+            <a:schemeClr val="accent1">
+              <a:shade val="50000"/>
+            </a:schemeClr>
+          </a:lnRef>
+          <a:fillRef idx="1">
+            <a:schemeClr val="accent1"/>
+          </a:fillRef>
+          <a:effectRef idx="0">
+            <a:schemeClr val="accent1"/>
+          </a:effectRef>
+          <a:fontRef idx="minor">
+            <a:schemeClr val="lt1"/>
+          </a:fontRef>
+        </p:style>
+      </p:sp>
+      <p:cxnSp>
+        <p:nvCxnSpPr>
+          <p:cNvPr id="83" name="Straight Connector 82"/>
+          <p:cNvCxnSpPr>
+            <a:cxnSpLocks noGrp="1" noRot="1" noChangeAspect="1" noMove="1" noResize="1" noEditPoints="1" noAdjustHandles="1" noChangeArrowheads="1" noChangeShapeType="1"/>
+          </p:cNvCxnSpPr>
+          <p:nvPr>
+            <p:extLst>
+              <p:ext uri="{386F3935-93C4-4BCD-93E2-E3B085C9AB24}">
+                <p16:designElem xmlns:p16="http://schemas.microsoft.com/office/powerpoint/2015/main" val="1"/>
+              </p:ext>
+            </p:extLst>
+          </p:nvPr>
+        </p:nvCxnSpPr>
+        <p:spPr>
+          <a:xfrm>
+            <a:off x="8209305" y="4343400"/>
+            <a:ext cx="3200400" cy="0"/>
+          </a:xfrm>
+          <a:prstGeom prst="line">
+            <a:avLst/>
+          </a:prstGeom>
+          <a:ln w="6350">
+            <a:solidFill>
+              <a:schemeClr val="tx2">
+                <a:alpha val="90000"/>
+              </a:schemeClr>
+            </a:solidFill>
+          </a:ln>
+        </p:spPr>
+        <p:style>
+          <a:lnRef idx="1">
+            <a:schemeClr val="accent1"/>
+          </a:lnRef>
+          <a:fillRef idx="0">
+            <a:schemeClr val="accent1"/>
+          </a:fillRef>
+          <a:effectRef idx="0">
+            <a:schemeClr val="accent1"/>
+          </a:effectRef>
+          <a:fontRef idx="minor">
+            <a:schemeClr val="tx1"/>
+          </a:fontRef>
+        </p:style>
+      </p:cxnSp>
+      <p:pic>
+        <p:nvPicPr>
+          <p:cNvPr id="1025" name="Picture 1" descr="Untitled Diagram (1)"/>
+          <p:cNvPicPr>
+            <a:picLocks noChangeAspect="1" noChangeArrowheads="1"/>
+          </p:cNvPicPr>
+          <p:nvPr/>
+        </p:nvPicPr>
+        <p:blipFill rotWithShape="1">
+          <a:blip r:embed="rId2">
+            <a:extLst>
+              <a:ext uri="{28A0092B-C50C-407E-A947-70E740481C1C}">
+                <a14:useLocalDpi xmlns:a14="http://schemas.microsoft.com/office/drawing/2010/main" val="0"/>
+              </a:ext>
+            </a:extLst>
+          </a:blip>
+          <a:srcRect/>
+          <a:stretch/>
+        </p:blipFill>
+        <p:spPr bwMode="auto">
+          <a:xfrm>
+            <a:off x="329185" y="597624"/>
+            <a:ext cx="7687473" cy="5213007"/>
+          </a:xfrm>
+          <a:prstGeom prst="rect">
+            <a:avLst/>
+          </a:prstGeom>
+          <a:noFill/>
+          <a:extLst>
+            <a:ext uri="{909E8E84-426E-40DD-AFC4-6F175D3DCCD1}">
+              <a14:hiddenFill xmlns:a14="http://schemas.microsoft.com/office/drawing/2010/main">
+                <a:solidFill>
+                  <a:srgbClr val="FFFFFF"/>
+                </a:solidFill>
+              </a14:hiddenFill>
+            </a:ext>
+          </a:extLst>
+        </p:spPr>
+      </p:pic>
+      <p:sp>
+        <p:nvSpPr>
           <p:cNvPr id="2" name="Título 1"/>
           <p:cNvSpPr>
             <a:spLocks noGrp="1"/>
@@ -4373,49 +5116,130 @@
             <p:ph type="title"/>
           </p:nvPr>
         </p:nvSpPr>
-        <p:spPr/>
-        <p:txBody>
-          <a:bodyPr/>
+        <p:spPr>
+          <a:xfrm>
+            <a:off x="8141110" y="639097"/>
+            <a:ext cx="3401961" cy="3686015"/>
+          </a:xfrm>
+        </p:spPr>
+        <p:txBody>
+          <a:bodyPr vert="horz" lIns="91440" tIns="45720" rIns="91440" bIns="45720" rtlCol="0" anchor="b">
+            <a:normAutofit/>
+          </a:bodyPr>
           <a:lstStyle/>
           <a:p>
             <a:r>
-              <a:rPr lang="pt-PT" b="1" dirty="0"/>
-              <a:t>Plano de desenvolvimento</a:t>
-            </a:r>
-            <a:r>
-              <a:rPr lang="pt-PT" dirty="0"/>
+              <a:rPr lang="en-US" sz="6600" b="1">
+                <a:solidFill>
+                  <a:schemeClr val="tx1">
+                    <a:lumMod val="85000"/>
+                    <a:lumOff val="15000"/>
+                  </a:schemeClr>
+                </a:solidFill>
+              </a:rPr>
+              <a:t>Maqueta do sistema</a:t>
+            </a:r>
+            <a:r>
+              <a:rPr lang="en-US" sz="6600">
+                <a:solidFill>
+                  <a:schemeClr val="tx1">
+                    <a:lumMod val="85000"/>
+                    <a:lumOff val="15000"/>
+                  </a:schemeClr>
+                </a:solidFill>
+              </a:rPr>
               <a:t/>
             </a:r>
             <a:br>
-              <a:rPr lang="pt-PT" dirty="0"/>
-            </a:br>
-            <a:endParaRPr lang="pt-PT" dirty="0"/>
-          </a:p>
-        </p:txBody>
-      </p:sp>
-      <p:sp>
-        <p:nvSpPr>
-          <p:cNvPr id="3" name="Marcador de Posição de Conteúdo 2"/>
-          <p:cNvSpPr>
-            <a:spLocks noGrp="1"/>
-          </p:cNvSpPr>
-          <p:nvPr>
-            <p:ph idx="1"/>
-          </p:nvPr>
-        </p:nvSpPr>
-        <p:spPr/>
-        <p:txBody>
-          <a:bodyPr/>
+              <a:rPr lang="en-US" sz="6600">
+                <a:solidFill>
+                  <a:schemeClr val="tx1">
+                    <a:lumMod val="85000"/>
+                    <a:lumOff val="15000"/>
+                  </a:schemeClr>
+                </a:solidFill>
+              </a:rPr>
+            </a:br>
+            <a:endParaRPr lang="en-US" sz="6600">
+              <a:solidFill>
+                <a:schemeClr val="tx1">
+                  <a:lumMod val="85000"/>
+                  <a:lumOff val="15000"/>
+                </a:schemeClr>
+              </a:solidFill>
+            </a:endParaRPr>
+          </a:p>
+        </p:txBody>
+      </p:sp>
+      <p:sp>
+        <p:nvSpPr>
+          <p:cNvPr id="4" name="Rectangle 2"/>
+          <p:cNvSpPr>
+            <a:spLocks noChangeArrowheads="1"/>
+          </p:cNvSpPr>
+          <p:nvPr/>
+        </p:nvSpPr>
+        <p:spPr bwMode="auto">
+          <a:xfrm>
+            <a:off x="0" y="0"/>
+            <a:ext cx="12192000" cy="0"/>
+          </a:xfrm>
+          <a:prstGeom prst="rect">
+            <a:avLst/>
+          </a:prstGeom>
+          <a:noFill/>
+          <a:ln>
+            <a:noFill/>
+          </a:ln>
+          <a:effectLst/>
+          <a:extLst>
+            <a:ext uri="{909E8E84-426E-40DD-AFC4-6F175D3DCCD1}">
+              <a14:hiddenFill xmlns:a14="http://schemas.microsoft.com/office/drawing/2010/main">
+                <a:solidFill>
+                  <a:schemeClr val="accent1"/>
+                </a:solidFill>
+              </a14:hiddenFill>
+            </a:ext>
+            <a:ext uri="{91240B29-F687-4F45-9708-019B960494DF}">
+              <a14:hiddenLine xmlns:a14="http://schemas.microsoft.com/office/drawing/2010/main" w="9525">
+                <a:solidFill>
+                  <a:schemeClr val="tx1"/>
+                </a:solidFill>
+                <a:miter lim="800000"/>
+                <a:headEnd/>
+                <a:tailEnd/>
+              </a14:hiddenLine>
+            </a:ext>
+            <a:ext uri="{AF507438-7753-43E0-B8FC-AC1667EBCBE1}">
+              <a14:hiddenEffects xmlns:a14="http://schemas.microsoft.com/office/drawing/2010/main">
+                <a:effectLst>
+                  <a:outerShdw blurRad="63500" dist="38099" dir="2700000" algn="ctr" rotWithShape="0">
+                    <a:schemeClr val="bg2">
+                      <a:alpha val="74998"/>
+                    </a:schemeClr>
+                  </a:outerShdw>
+                </a:effectLst>
+              </a14:hiddenEffects>
+            </a:ext>
+          </a:extLst>
+        </p:spPr>
+        <p:txBody>
+          <a:bodyPr vert="horz" wrap="none" lIns="91440" tIns="45720" rIns="91440" bIns="45720" numCol="1" anchor="ctr" anchorCtr="0" compatLnSpc="1">
+            <a:prstTxWarp prst="textNoShape">
+              <a:avLst/>
+            </a:prstTxWarp>
+            <a:spAutoFit/>
+          </a:bodyPr>
           <a:lstStyle/>
           <a:p>
-            <a:endParaRPr lang="pt-PT" dirty="0"/>
+            <a:endParaRPr lang="pt-PT"/>
           </a:p>
         </p:txBody>
       </p:sp>
     </p:spTree>
     <p:extLst>
       <p:ext uri="{BB962C8B-B14F-4D97-AF65-F5344CB8AC3E}">
-        <p14:creationId xmlns:p14="http://schemas.microsoft.com/office/powerpoint/2010/main" val="1956684480"/>
+        <p14:creationId xmlns:p14="http://schemas.microsoft.com/office/powerpoint/2010/main" val="1445414679"/>
       </p:ext>
     </p:extLst>
   </p:cSld>
@@ -4461,652 +5285,148 @@
         </p:nvSpPr>
         <p:spPr/>
         <p:txBody>
-          <a:bodyPr/>
-          <a:lstStyle/>
-          <a:p>
-            <a:endParaRPr lang="pt-PT" dirty="0"/>
-          </a:p>
-        </p:txBody>
-      </p:sp>
-      <p:sp>
-        <p:nvSpPr>
-          <p:cNvPr id="3" name="Marcador de Posição de Conteúdo 2"/>
-          <p:cNvSpPr>
-            <a:spLocks noGrp="1"/>
-          </p:cNvSpPr>
-          <p:nvPr>
-            <p:ph idx="1"/>
-          </p:nvPr>
-        </p:nvSpPr>
-        <p:spPr>
-          <a:xfrm>
-            <a:off x="1097280" y="1845733"/>
-            <a:ext cx="10058400" cy="4724399"/>
-          </a:xfrm>
-        </p:spPr>
-        <p:txBody>
-          <a:bodyPr numCol="3" spcCol="36000">
-            <a:normAutofit fontScale="62500" lnSpcReduction="20000"/>
+          <a:bodyPr>
+            <a:normAutofit/>
           </a:bodyPr>
           <a:lstStyle/>
           <a:p>
             <a:r>
-              <a:rPr lang="pt-PT" dirty="0"/>
-              <a:t>1) </a:t>
-            </a:r>
-            <a:br>
-              <a:rPr lang="pt-PT" dirty="0"/>
-            </a:br>
-            <a:r>
-              <a:rPr lang="pt-PT" dirty="0"/>
-              <a:t> A </a:t>
-            </a:r>
-            <a:br>
-              <a:rPr lang="pt-PT" dirty="0"/>
-            </a:br>
-            <a:r>
-              <a:rPr lang="pt-PT" dirty="0"/>
-              <a:t> apresentação </a:t>
-            </a:r>
-            <a:br>
-              <a:rPr lang="pt-PT" dirty="0"/>
-            </a:br>
-            <a:r>
-              <a:rPr lang="pt-PT" dirty="0"/>
-              <a:t> e </a:t>
-            </a:r>
-            <a:br>
-              <a:rPr lang="pt-PT" dirty="0"/>
-            </a:br>
-            <a:r>
-              <a:rPr lang="pt-PT" dirty="0"/>
-              <a:t> a </a:t>
-            </a:r>
-            <a:br>
-              <a:rPr lang="pt-PT" dirty="0"/>
-            </a:br>
-            <a:r>
-              <a:rPr lang="pt-PT" dirty="0"/>
-              <a:t> contextualização </a:t>
-            </a:r>
-            <a:br>
-              <a:rPr lang="pt-PT" dirty="0"/>
-            </a:br>
-            <a:r>
-              <a:rPr lang="pt-PT" dirty="0"/>
-              <a:t> do </a:t>
-            </a:r>
-            <a:br>
-              <a:rPr lang="pt-PT" dirty="0"/>
-            </a:br>
-            <a:r>
-              <a:rPr lang="pt-PT" dirty="0"/>
-              <a:t> problema </a:t>
-            </a:r>
-            <a:br>
-              <a:rPr lang="pt-PT" dirty="0"/>
-            </a:br>
-            <a:r>
-              <a:rPr lang="pt-PT" dirty="0"/>
-              <a:t> foi </a:t>
-            </a:r>
-            <a:br>
-              <a:rPr lang="pt-PT" dirty="0"/>
-            </a:br>
-            <a:r>
-              <a:rPr lang="pt-PT" dirty="0"/>
-              <a:t> apresentada </a:t>
-            </a:r>
-            <a:br>
-              <a:rPr lang="pt-PT" dirty="0"/>
-            </a:br>
-            <a:r>
-              <a:rPr lang="pt-PT" dirty="0"/>
-              <a:t> de </a:t>
-            </a:r>
-            <a:br>
-              <a:rPr lang="pt-PT" dirty="0"/>
-            </a:br>
-            <a:r>
-              <a:rPr lang="pt-PT" dirty="0"/>
-              <a:t> forma </a:t>
-            </a:r>
-            <a:br>
-              <a:rPr lang="pt-PT" dirty="0"/>
-            </a:br>
-            <a:r>
-              <a:rPr lang="pt-PT" dirty="0"/>
-              <a:t> clara?</a:t>
-            </a:r>
-          </a:p>
-          <a:p>
-            <a:r>
-              <a:rPr lang="pt-PT" dirty="0"/>
-              <a:t>2) </a:t>
-            </a:r>
-            <a:br>
-              <a:rPr lang="pt-PT" dirty="0"/>
-            </a:br>
-            <a:r>
-              <a:rPr lang="pt-PT" dirty="0"/>
-              <a:t> A </a:t>
-            </a:r>
-            <a:br>
-              <a:rPr lang="pt-PT" dirty="0"/>
-            </a:br>
-            <a:r>
-              <a:rPr lang="pt-PT" dirty="0"/>
-              <a:t> motivação </a:t>
-            </a:r>
-            <a:br>
-              <a:rPr lang="pt-PT" dirty="0"/>
-            </a:br>
-            <a:r>
-              <a:rPr lang="pt-PT" dirty="0"/>
-              <a:t> e </a:t>
-            </a:r>
-            <a:br>
-              <a:rPr lang="pt-PT" dirty="0"/>
-            </a:br>
-            <a:r>
-              <a:rPr lang="pt-PT" dirty="0"/>
-              <a:t> os </a:t>
-            </a:r>
-            <a:br>
-              <a:rPr lang="pt-PT" dirty="0"/>
-            </a:br>
-            <a:r>
-              <a:rPr lang="pt-PT" dirty="0"/>
-              <a:t> </a:t>
-            </a:r>
-            <a:r>
-              <a:rPr lang="pt-PT" dirty="0" err="1"/>
-              <a:t>objectivos</a:t>
+              <a:rPr lang="pt-PT" b="1" dirty="0"/>
+              <a:t>Definição de um conjunto de medidas de </a:t>
+            </a:r>
+            <a:r>
+              <a:rPr lang="pt-PT" b="1" dirty="0" smtClean="0"/>
+              <a:t>sucesso</a:t>
+            </a:r>
+            <a:endParaRPr lang="pt-PT" b="1" dirty="0"/>
+          </a:p>
+        </p:txBody>
+      </p:sp>
+      <p:sp>
+        <p:nvSpPr>
+          <p:cNvPr id="3" name="Marcador de Posição de Conteúdo 2"/>
+          <p:cNvSpPr>
+            <a:spLocks noGrp="1"/>
+          </p:cNvSpPr>
+          <p:nvPr>
+            <p:ph idx="1"/>
+          </p:nvPr>
+        </p:nvSpPr>
+        <p:spPr>
+          <a:xfrm>
+            <a:off x="751562" y="1845733"/>
+            <a:ext cx="10947748" cy="4229389"/>
+          </a:xfrm>
+        </p:spPr>
+        <p:txBody>
+          <a:bodyPr>
+            <a:normAutofit lnSpcReduction="10000"/>
+          </a:bodyPr>
+          <a:lstStyle/>
+          <a:p>
+            <a:pPr>
+              <a:buFont typeface="Wingdings" charset="2"/>
+              <a:buChar char="§"/>
+            </a:pPr>
+            <a:r>
+              <a:rPr lang="pt-PT" dirty="0" smtClean="0"/>
+              <a:t> Publico alvo  - </a:t>
+            </a:r>
+            <a:r>
+              <a:rPr lang="pt-PT" dirty="0"/>
+              <a:t>A aplicação será desenvolvida para qualquer pessoa que possua um </a:t>
+            </a:r>
+            <a:r>
+              <a:rPr lang="pt-PT" i="1" dirty="0" err="1"/>
+              <a:t>Smartphone</a:t>
+            </a:r>
+            <a:r>
+              <a:rPr lang="pt-PT" dirty="0"/>
+              <a:t> e sinta a necessidade de saber onde comer ‘algo’ que lhe apeteça.</a:t>
             </a:r>
             <a:r>
               <a:rPr lang="pt-PT" dirty="0"/>
               <a:t> </a:t>
             </a:r>
-            <a:br>
-              <a:rPr lang="pt-PT" dirty="0"/>
-            </a:br>
-            <a:r>
-              <a:rPr lang="pt-PT" dirty="0"/>
-              <a:t> do </a:t>
-            </a:r>
-            <a:br>
-              <a:rPr lang="pt-PT" dirty="0"/>
-            </a:br>
-            <a:r>
-              <a:rPr lang="pt-PT" dirty="0"/>
-              <a:t> problema </a:t>
-            </a:r>
-            <a:br>
-              <a:rPr lang="pt-PT" dirty="0"/>
-            </a:br>
-            <a:r>
-              <a:rPr lang="pt-PT" dirty="0"/>
-              <a:t> foram </a:t>
-            </a:r>
-            <a:br>
-              <a:rPr lang="pt-PT" dirty="0"/>
-            </a:br>
-            <a:r>
-              <a:rPr lang="pt-PT" dirty="0"/>
-              <a:t> bem </a:t>
-            </a:r>
-            <a:br>
-              <a:rPr lang="pt-PT" dirty="0"/>
-            </a:br>
-            <a:r>
-              <a:rPr lang="pt-PT" dirty="0"/>
-              <a:t> definidos </a:t>
-            </a:r>
-            <a:br>
-              <a:rPr lang="pt-PT" dirty="0"/>
-            </a:br>
-            <a:r>
-              <a:rPr lang="pt-PT" dirty="0"/>
-              <a:t> e </a:t>
-            </a:r>
-            <a:br>
-              <a:rPr lang="pt-PT" dirty="0"/>
-            </a:br>
-            <a:r>
-              <a:rPr lang="pt-PT" dirty="0"/>
-              <a:t> expostos?</a:t>
-            </a:r>
-          </a:p>
-          <a:p>
-            <a:r>
-              <a:rPr lang="pt-PT" dirty="0"/>
-              <a:t>3) </a:t>
-            </a:r>
-            <a:br>
-              <a:rPr lang="pt-PT" dirty="0"/>
-            </a:br>
-            <a:r>
-              <a:rPr lang="pt-PT" dirty="0"/>
-              <a:t> Houve </a:t>
-            </a:r>
-            <a:br>
-              <a:rPr lang="pt-PT" dirty="0"/>
-            </a:br>
-            <a:r>
-              <a:rPr lang="pt-PT" dirty="0"/>
-              <a:t> o </a:t>
-            </a:r>
-            <a:br>
-              <a:rPr lang="pt-PT" dirty="0"/>
-            </a:br>
-            <a:r>
-              <a:rPr lang="pt-PT" dirty="0"/>
-              <a:t> cuidado </a:t>
-            </a:r>
-            <a:br>
-              <a:rPr lang="pt-PT" dirty="0"/>
-            </a:br>
-            <a:r>
-              <a:rPr lang="pt-PT" dirty="0"/>
-              <a:t> de </a:t>
-            </a:r>
-            <a:br>
-              <a:rPr lang="pt-PT" dirty="0"/>
-            </a:br>
-            <a:r>
-              <a:rPr lang="pt-PT" dirty="0"/>
-              <a:t> caracterizar </a:t>
-            </a:r>
-            <a:br>
-              <a:rPr lang="pt-PT" dirty="0"/>
-            </a:br>
-            <a:r>
-              <a:rPr lang="pt-PT" dirty="0"/>
-              <a:t> um </a:t>
-            </a:r>
-            <a:br>
-              <a:rPr lang="pt-PT" dirty="0"/>
-            </a:br>
-            <a:r>
-              <a:rPr lang="pt-PT" dirty="0"/>
-              <a:t> eventual </a:t>
-            </a:r>
-            <a:br>
-              <a:rPr lang="pt-PT" dirty="0"/>
-            </a:br>
-            <a:r>
-              <a:rPr lang="pt-PT" dirty="0"/>
-              <a:t> cliente </a:t>
-            </a:r>
-            <a:br>
-              <a:rPr lang="pt-PT" dirty="0"/>
-            </a:br>
-            <a:r>
-              <a:rPr lang="pt-PT" dirty="0"/>
-              <a:t> para </a:t>
-            </a:r>
-            <a:br>
-              <a:rPr lang="pt-PT" dirty="0"/>
-            </a:br>
-            <a:r>
-              <a:rPr lang="pt-PT" dirty="0"/>
-              <a:t> a </a:t>
-            </a:r>
-            <a:br>
-              <a:rPr lang="pt-PT" dirty="0"/>
-            </a:br>
-            <a:r>
-              <a:rPr lang="pt-PT" dirty="0"/>
-              <a:t> aplicação </a:t>
-            </a:r>
-            <a:br>
-              <a:rPr lang="pt-PT" dirty="0"/>
-            </a:br>
-            <a:r>
-              <a:rPr lang="pt-PT" dirty="0"/>
-              <a:t> proposta?</a:t>
-            </a:r>
-          </a:p>
-          <a:p>
-            <a:r>
-              <a:rPr lang="pt-PT" dirty="0"/>
-              <a:t>4) </a:t>
-            </a:r>
-            <a:br>
-              <a:rPr lang="pt-PT" dirty="0"/>
-            </a:br>
-            <a:r>
-              <a:rPr lang="pt-PT" dirty="0"/>
-              <a:t> Os </a:t>
-            </a:r>
-            <a:br>
-              <a:rPr lang="pt-PT" dirty="0"/>
-            </a:br>
-            <a:r>
-              <a:rPr lang="pt-PT" dirty="0"/>
-              <a:t> serviços </a:t>
-            </a:r>
-            <a:br>
-              <a:rPr lang="pt-PT" dirty="0"/>
-            </a:br>
-            <a:r>
-              <a:rPr lang="pt-PT" dirty="0"/>
-              <a:t> da </a:t>
-            </a:r>
-            <a:br>
-              <a:rPr lang="pt-PT" dirty="0"/>
-            </a:br>
-            <a:r>
-              <a:rPr lang="pt-PT" dirty="0"/>
-              <a:t> futura </a:t>
-            </a:r>
-            <a:br>
-              <a:rPr lang="pt-PT" dirty="0"/>
-            </a:br>
-            <a:r>
-              <a:rPr lang="pt-PT" dirty="0"/>
-              <a:t> aplicação </a:t>
-            </a:r>
-            <a:br>
-              <a:rPr lang="pt-PT" dirty="0"/>
-            </a:br>
-            <a:r>
-              <a:rPr lang="pt-PT" dirty="0"/>
-              <a:t> foram </a:t>
-            </a:r>
-            <a:br>
-              <a:rPr lang="pt-PT" dirty="0"/>
-            </a:br>
-            <a:r>
-              <a:rPr lang="pt-PT" dirty="0"/>
-              <a:t> bem </a:t>
-            </a:r>
-            <a:br>
-              <a:rPr lang="pt-PT" dirty="0"/>
-            </a:br>
-            <a:r>
-              <a:rPr lang="pt-PT" dirty="0"/>
-              <a:t> apresentados?</a:t>
-            </a:r>
-          </a:p>
-          <a:p>
-            <a:r>
-              <a:rPr lang="pt-PT" dirty="0"/>
-              <a:t>5) </a:t>
-            </a:r>
-            <a:br>
-              <a:rPr lang="pt-PT" dirty="0"/>
-            </a:br>
-            <a:r>
-              <a:rPr lang="pt-PT" dirty="0"/>
-              <a:t> Houve </a:t>
-            </a:r>
-            <a:br>
-              <a:rPr lang="pt-PT" dirty="0"/>
-            </a:br>
-            <a:r>
-              <a:rPr lang="pt-PT" dirty="0"/>
-              <a:t> a </a:t>
-            </a:r>
-            <a:br>
-              <a:rPr lang="pt-PT" dirty="0"/>
-            </a:br>
-            <a:r>
-              <a:rPr lang="pt-PT" dirty="0"/>
-              <a:t> preocupação </a:t>
-            </a:r>
-            <a:br>
-              <a:rPr lang="pt-PT" dirty="0"/>
-            </a:br>
-            <a:r>
-              <a:rPr lang="pt-PT" dirty="0"/>
-              <a:t> de </a:t>
-            </a:r>
-            <a:br>
-              <a:rPr lang="pt-PT" dirty="0"/>
-            </a:br>
-            <a:r>
-              <a:rPr lang="pt-PT" dirty="0"/>
-              <a:t> caracterizar </a:t>
-            </a:r>
-            <a:br>
-              <a:rPr lang="pt-PT" dirty="0"/>
-            </a:br>
-            <a:r>
-              <a:rPr lang="pt-PT" dirty="0"/>
-              <a:t> cada </a:t>
-            </a:r>
-            <a:br>
-              <a:rPr lang="pt-PT" dirty="0"/>
-            </a:br>
-            <a:r>
-              <a:rPr lang="pt-PT" dirty="0"/>
-              <a:t> um </a:t>
-            </a:r>
-            <a:br>
-              <a:rPr lang="pt-PT" dirty="0"/>
-            </a:br>
-            <a:r>
-              <a:rPr lang="pt-PT" dirty="0"/>
-              <a:t> dos </a:t>
-            </a:r>
-            <a:br>
-              <a:rPr lang="pt-PT" dirty="0"/>
-            </a:br>
-            <a:r>
-              <a:rPr lang="pt-PT" dirty="0"/>
-              <a:t> serviços </a:t>
-            </a:r>
-            <a:br>
-              <a:rPr lang="pt-PT" dirty="0"/>
-            </a:br>
-            <a:r>
-              <a:rPr lang="pt-PT" dirty="0"/>
-              <a:t> apresentados?</a:t>
-            </a:r>
-          </a:p>
-          <a:p>
-            <a:r>
-              <a:rPr lang="pt-PT" dirty="0"/>
-              <a:t>6) </a:t>
-            </a:r>
-            <a:br>
-              <a:rPr lang="pt-PT" dirty="0"/>
-            </a:br>
-            <a:r>
-              <a:rPr lang="pt-PT" dirty="0"/>
-              <a:t> A </a:t>
-            </a:r>
-            <a:br>
-              <a:rPr lang="pt-PT" dirty="0"/>
-            </a:br>
-            <a:r>
-              <a:rPr lang="pt-PT" dirty="0"/>
-              <a:t> qualidade </a:t>
-            </a:r>
-            <a:br>
-              <a:rPr lang="pt-PT" dirty="0"/>
-            </a:br>
-            <a:r>
-              <a:rPr lang="pt-PT" dirty="0"/>
-              <a:t> da </a:t>
-            </a:r>
-            <a:br>
-              <a:rPr lang="pt-PT" dirty="0"/>
-            </a:br>
-            <a:r>
-              <a:rPr lang="pt-PT" dirty="0"/>
-              <a:t> planificação </a:t>
-            </a:r>
-            <a:br>
-              <a:rPr lang="pt-PT" dirty="0"/>
-            </a:br>
-            <a:r>
-              <a:rPr lang="pt-PT" dirty="0"/>
-              <a:t> realizada </a:t>
-            </a:r>
-            <a:br>
-              <a:rPr lang="pt-PT" dirty="0"/>
-            </a:br>
-            <a:r>
-              <a:rPr lang="pt-PT" dirty="0"/>
-              <a:t> está </a:t>
-            </a:r>
-            <a:br>
-              <a:rPr lang="pt-PT" dirty="0"/>
-            </a:br>
-            <a:r>
-              <a:rPr lang="pt-PT" dirty="0"/>
-              <a:t> de </a:t>
-            </a:r>
-            <a:br>
-              <a:rPr lang="pt-PT" dirty="0"/>
-            </a:br>
-            <a:r>
-              <a:rPr lang="pt-PT" dirty="0"/>
-              <a:t> acordo </a:t>
-            </a:r>
-            <a:br>
-              <a:rPr lang="pt-PT" dirty="0"/>
-            </a:br>
-            <a:r>
-              <a:rPr lang="pt-PT" dirty="0"/>
-              <a:t> com </a:t>
-            </a:r>
-            <a:br>
-              <a:rPr lang="pt-PT" dirty="0"/>
-            </a:br>
-            <a:r>
-              <a:rPr lang="pt-PT" dirty="0"/>
-              <a:t> o </a:t>
-            </a:r>
-            <a:br>
-              <a:rPr lang="pt-PT" dirty="0"/>
-            </a:br>
-            <a:r>
-              <a:rPr lang="pt-PT" dirty="0"/>
-              <a:t> projeto </a:t>
-            </a:r>
-            <a:br>
-              <a:rPr lang="pt-PT" dirty="0"/>
-            </a:br>
-            <a:r>
-              <a:rPr lang="pt-PT" dirty="0"/>
-              <a:t> em </a:t>
-            </a:r>
-            <a:br>
-              <a:rPr lang="pt-PT" dirty="0"/>
-            </a:br>
-            <a:r>
-              <a:rPr lang="pt-PT" dirty="0"/>
-              <a:t> causa?</a:t>
-            </a:r>
-          </a:p>
-          <a:p>
-            <a:r>
-              <a:rPr lang="pt-PT" dirty="0"/>
-              <a:t>7) </a:t>
-            </a:r>
-            <a:br>
-              <a:rPr lang="pt-PT" dirty="0"/>
-            </a:br>
-            <a:r>
-              <a:rPr lang="pt-PT" dirty="0"/>
-              <a:t> A </a:t>
-            </a:r>
-            <a:br>
-              <a:rPr lang="pt-PT" dirty="0"/>
-            </a:br>
-            <a:r>
-              <a:rPr lang="pt-PT" dirty="0"/>
-              <a:t> qualidade </a:t>
-            </a:r>
-            <a:br>
-              <a:rPr lang="pt-PT" dirty="0"/>
-            </a:br>
-            <a:r>
-              <a:rPr lang="pt-PT" dirty="0"/>
-              <a:t> geral </a:t>
-            </a:r>
-            <a:br>
-              <a:rPr lang="pt-PT" dirty="0"/>
-            </a:br>
-            <a:r>
-              <a:rPr lang="pt-PT" dirty="0"/>
-              <a:t> da </a:t>
-            </a:r>
-            <a:br>
-              <a:rPr lang="pt-PT" dirty="0"/>
-            </a:br>
-            <a:r>
-              <a:rPr lang="pt-PT" dirty="0"/>
-              <a:t> apresentação </a:t>
-            </a:r>
-            <a:br>
-              <a:rPr lang="pt-PT" dirty="0"/>
-            </a:br>
-            <a:r>
-              <a:rPr lang="pt-PT" dirty="0"/>
-              <a:t> realizada </a:t>
-            </a:r>
-            <a:br>
-              <a:rPr lang="pt-PT" dirty="0"/>
-            </a:br>
-            <a:r>
-              <a:rPr lang="pt-PT" dirty="0"/>
-              <a:t> está </a:t>
-            </a:r>
-            <a:br>
-              <a:rPr lang="pt-PT" dirty="0"/>
-            </a:br>
-            <a:r>
-              <a:rPr lang="pt-PT" dirty="0"/>
-              <a:t> de </a:t>
-            </a:r>
-            <a:br>
-              <a:rPr lang="pt-PT" dirty="0"/>
-            </a:br>
-            <a:r>
-              <a:rPr lang="pt-PT" dirty="0"/>
-              <a:t> acordo </a:t>
-            </a:r>
-            <a:br>
-              <a:rPr lang="pt-PT" dirty="0"/>
-            </a:br>
-            <a:r>
-              <a:rPr lang="pt-PT" dirty="0"/>
-              <a:t> com </a:t>
-            </a:r>
-            <a:br>
-              <a:rPr lang="pt-PT" dirty="0"/>
-            </a:br>
-            <a:r>
-              <a:rPr lang="pt-PT" dirty="0"/>
-              <a:t> o </a:t>
-            </a:r>
-            <a:br>
-              <a:rPr lang="pt-PT" dirty="0"/>
-            </a:br>
-            <a:r>
-              <a:rPr lang="pt-PT" dirty="0"/>
-              <a:t> projeto </a:t>
-            </a:r>
-            <a:br>
-              <a:rPr lang="pt-PT" dirty="0"/>
-            </a:br>
-            <a:r>
-              <a:rPr lang="pt-PT" dirty="0"/>
-              <a:t> em </a:t>
-            </a:r>
-            <a:br>
-              <a:rPr lang="pt-PT" dirty="0"/>
-            </a:br>
-            <a:r>
-              <a:rPr lang="pt-PT" dirty="0"/>
-              <a:t> causa?</a:t>
-            </a:r>
-          </a:p>
-          <a:p>
+            <a:r>
+              <a:rPr lang="pt-PT" dirty="0"/>
+              <a:t>Não necessita que as pessoas que usem a aplicação tenham um grau elevado de escolaridade, pois é bastante simples e apenas basta ter algum treino com </a:t>
+            </a:r>
+            <a:r>
+              <a:rPr lang="pt-PT" i="1" dirty="0" err="1"/>
+              <a:t>Smartphones</a:t>
+            </a:r>
+            <a:r>
+              <a:rPr lang="pt-PT" i="1" dirty="0"/>
+              <a:t>. </a:t>
+            </a:r>
+            <a:endParaRPr lang="pt-PT" i="1" dirty="0" smtClean="0"/>
+          </a:p>
+          <a:p>
+            <a:pPr>
+              <a:buFont typeface="Wingdings" charset="2"/>
+              <a:buChar char="§"/>
+            </a:pPr>
+            <a:endParaRPr lang="pt-PT" dirty="0" smtClean="0"/>
+          </a:p>
+          <a:p>
+            <a:pPr>
+              <a:buFont typeface="Wingdings" charset="2"/>
+              <a:buChar char="§"/>
+            </a:pPr>
+            <a:r>
+              <a:rPr lang="pt-PT" dirty="0"/>
+              <a:t> </a:t>
+            </a:r>
+            <a:r>
+              <a:rPr lang="pt-PT" dirty="0" smtClean="0"/>
+              <a:t>Facilidade de acesso à aplicação - </a:t>
+            </a:r>
+            <a:r>
+              <a:rPr lang="pt-PT" dirty="0"/>
+              <a:t>O mercado de aplicações móveis é diferenciado e abrangente, sendo necessário para aceder ao mesmo apenas uma conexão com a Internet através do </a:t>
+            </a:r>
+            <a:r>
+              <a:rPr lang="pt-PT" i="1" dirty="0" err="1"/>
+              <a:t>Smartphone</a:t>
+            </a:r>
+            <a:r>
+              <a:rPr lang="pt-PT" dirty="0"/>
+              <a:t>. Dessa forma, o limite de alcance de mercado seria imposto apenas pelas questões de marketing e interesses pessoais</a:t>
+            </a:r>
+            <a:r>
+              <a:rPr lang="pt-PT" dirty="0" smtClean="0"/>
+              <a:t>.</a:t>
+            </a:r>
+          </a:p>
+          <a:p>
+            <a:pPr>
+              <a:buFont typeface="Wingdings" charset="2"/>
+              <a:buChar char="§"/>
+            </a:pPr>
+            <a:endParaRPr lang="pt-PT" dirty="0" smtClean="0"/>
+          </a:p>
+          <a:p>
+            <a:pPr>
+              <a:buFont typeface="Wingdings" charset="2"/>
+              <a:buChar char="§"/>
+            </a:pPr>
+            <a:r>
+              <a:rPr lang="pt-PT" dirty="0"/>
+              <a:t> </a:t>
+            </a:r>
+            <a:r>
+              <a:rPr lang="pt-PT" dirty="0" smtClean="0"/>
+              <a:t>Testes à interface - </a:t>
+            </a:r>
+            <a:r>
+              <a:rPr lang="pt-PT" dirty="0"/>
+              <a:t>Por mais que o levantamento de requisitos levante uma infinidade de informações que deverão estar dispostas na interface, é durante a interação real do utilizador com o sistema que os detalhes realmente são percebidos</a:t>
+            </a:r>
+            <a:r>
+              <a:rPr lang="pt-PT" dirty="0"/>
+              <a:t> </a:t>
+            </a:r>
             <a:endParaRPr lang="pt-PT" dirty="0"/>
           </a:p>
         </p:txBody>
@@ -5114,7 +5434,7 @@
     </p:spTree>
     <p:extLst>
       <p:ext uri="{BB962C8B-B14F-4D97-AF65-F5344CB8AC3E}">
-        <p14:creationId xmlns:p14="http://schemas.microsoft.com/office/powerpoint/2010/main" val="355919761"/>
+        <p14:creationId xmlns:p14="http://schemas.microsoft.com/office/powerpoint/2010/main" val="1029329295"/>
       </p:ext>
     </p:extLst>
   </p:cSld>
@@ -5148,6 +5468,1236 @@
           <a:chExt cx="0" cy="0"/>
         </a:xfrm>
       </p:grpSpPr>
+      <p:sp useBgFill="1">
+        <p:nvSpPr>
+          <p:cNvPr id="43" name="Rectangle 42"/>
+          <p:cNvSpPr>
+            <a:spLocks noGrp="1" noRot="1" noChangeAspect="1" noMove="1" noResize="1" noEditPoints="1" noAdjustHandles="1" noChangeArrowheads="1" noChangeShapeType="1" noTextEdit="1"/>
+          </p:cNvSpPr>
+          <p:nvPr>
+            <p:extLst>
+              <p:ext uri="{386F3935-93C4-4BCD-93E2-E3B085C9AB24}">
+                <p16:designElem xmlns:p16="http://schemas.microsoft.com/office/powerpoint/2015/main" val="1"/>
+              </p:ext>
+            </p:extLst>
+          </p:nvPr>
+        </p:nvSpPr>
+        <p:spPr>
+          <a:xfrm>
+            <a:off x="0" y="0"/>
+            <a:ext cx="12192001" cy="6334316"/>
+          </a:xfrm>
+          <a:prstGeom prst="rect">
+            <a:avLst/>
+          </a:prstGeom>
+          <a:ln>
+            <a:noFill/>
+          </a:ln>
+        </p:spPr>
+        <p:style>
+          <a:lnRef idx="2">
+            <a:schemeClr val="accent1">
+              <a:shade val="50000"/>
+            </a:schemeClr>
+          </a:lnRef>
+          <a:fillRef idx="1">
+            <a:schemeClr val="accent1"/>
+          </a:fillRef>
+          <a:effectRef idx="0">
+            <a:schemeClr val="accent1"/>
+          </a:effectRef>
+          <a:fontRef idx="minor">
+            <a:schemeClr val="lt1"/>
+          </a:fontRef>
+        </p:style>
+        <p:txBody>
+          <a:bodyPr rtlCol="0" anchor="ctr"/>
+          <a:lstStyle/>
+          <a:p>
+            <a:pPr algn="ctr"/>
+            <a:endParaRPr lang="en-US"/>
+          </a:p>
+        </p:txBody>
+      </p:sp>
+      <p:sp>
+        <p:nvSpPr>
+          <p:cNvPr id="45" name="Rectangle 44"/>
+          <p:cNvSpPr>
+            <a:spLocks noGrp="1" noRot="1" noChangeAspect="1" noMove="1" noResize="1" noEditPoints="1" noAdjustHandles="1" noChangeArrowheads="1" noChangeShapeType="1" noTextEdit="1"/>
+          </p:cNvSpPr>
+          <p:nvPr>
+            <p:extLst>
+              <p:ext uri="{386F3935-93C4-4BCD-93E2-E3B085C9AB24}">
+                <p16:designElem xmlns:p16="http://schemas.microsoft.com/office/powerpoint/2015/main" val="1"/>
+              </p:ext>
+            </p:extLst>
+          </p:nvPr>
+        </p:nvSpPr>
+        <p:spPr>
+          <a:xfrm>
+            <a:off x="1" y="6400800"/>
+            <a:ext cx="12192000" cy="457200"/>
+          </a:xfrm>
+          <a:prstGeom prst="rect">
+            <a:avLst/>
+          </a:prstGeom>
+          <a:solidFill>
+            <a:schemeClr val="accent2"/>
+          </a:solidFill>
+          <a:ln>
+            <a:noFill/>
+          </a:ln>
+        </p:spPr>
+        <p:style>
+          <a:lnRef idx="2">
+            <a:schemeClr val="accent1">
+              <a:shade val="50000"/>
+            </a:schemeClr>
+          </a:lnRef>
+          <a:fillRef idx="1">
+            <a:schemeClr val="accent1"/>
+          </a:fillRef>
+          <a:effectRef idx="0">
+            <a:schemeClr val="accent1"/>
+          </a:effectRef>
+          <a:fontRef idx="minor">
+            <a:schemeClr val="lt1"/>
+          </a:fontRef>
+        </p:style>
+      </p:sp>
+      <p:sp>
+        <p:nvSpPr>
+          <p:cNvPr id="47" name="Rectangle 46"/>
+          <p:cNvSpPr>
+            <a:spLocks noGrp="1" noRot="1" noChangeAspect="1" noMove="1" noResize="1" noEditPoints="1" noAdjustHandles="1" noChangeArrowheads="1" noChangeShapeType="1" noTextEdit="1"/>
+          </p:cNvSpPr>
+          <p:nvPr>
+            <p:extLst>
+              <p:ext uri="{386F3935-93C4-4BCD-93E2-E3B085C9AB24}">
+                <p16:designElem xmlns:p16="http://schemas.microsoft.com/office/powerpoint/2015/main" val="1"/>
+              </p:ext>
+            </p:extLst>
+          </p:nvPr>
+        </p:nvSpPr>
+        <p:spPr>
+          <a:xfrm>
+            <a:off x="15" y="6334316"/>
+            <a:ext cx="12191985" cy="66484"/>
+          </a:xfrm>
+          <a:prstGeom prst="rect">
+            <a:avLst/>
+          </a:prstGeom>
+          <a:solidFill>
+            <a:schemeClr val="accent1"/>
+          </a:solidFill>
+          <a:ln>
+            <a:noFill/>
+          </a:ln>
+        </p:spPr>
+        <p:style>
+          <a:lnRef idx="2">
+            <a:schemeClr val="accent1">
+              <a:shade val="50000"/>
+            </a:schemeClr>
+          </a:lnRef>
+          <a:fillRef idx="1">
+            <a:schemeClr val="accent1"/>
+          </a:fillRef>
+          <a:effectRef idx="0">
+            <a:schemeClr val="accent1"/>
+          </a:effectRef>
+          <a:fontRef idx="minor">
+            <a:schemeClr val="lt1"/>
+          </a:fontRef>
+        </p:style>
+      </p:sp>
+      <p:cxnSp>
+        <p:nvCxnSpPr>
+          <p:cNvPr id="49" name="Straight Connector 48"/>
+          <p:cNvCxnSpPr>
+            <a:cxnSpLocks noGrp="1" noRot="1" noChangeAspect="1" noMove="1" noResize="1" noEditPoints="1" noAdjustHandles="1" noChangeArrowheads="1" noChangeShapeType="1"/>
+          </p:cNvCxnSpPr>
+          <p:nvPr>
+            <p:extLst>
+              <p:ext uri="{386F3935-93C4-4BCD-93E2-E3B085C9AB24}">
+                <p16:designElem xmlns:p16="http://schemas.microsoft.com/office/powerpoint/2015/main" val="1"/>
+              </p:ext>
+            </p:extLst>
+          </p:nvPr>
+        </p:nvCxnSpPr>
+        <p:spPr>
+          <a:xfrm>
+            <a:off x="7892143" y="2085703"/>
+            <a:ext cx="3566160" cy="0"/>
+          </a:xfrm>
+          <a:prstGeom prst="line">
+            <a:avLst/>
+          </a:prstGeom>
+          <a:ln w="6350">
+            <a:solidFill>
+              <a:schemeClr val="tx1">
+                <a:lumMod val="50000"/>
+                <a:lumOff val="50000"/>
+                <a:alpha val="90000"/>
+              </a:schemeClr>
+            </a:solidFill>
+          </a:ln>
+        </p:spPr>
+        <p:style>
+          <a:lnRef idx="1">
+            <a:schemeClr val="accent1"/>
+          </a:lnRef>
+          <a:fillRef idx="0">
+            <a:schemeClr val="accent1"/>
+          </a:fillRef>
+          <a:effectRef idx="0">
+            <a:schemeClr val="accent1"/>
+          </a:effectRef>
+          <a:fontRef idx="minor">
+            <a:schemeClr val="tx1"/>
+          </a:fontRef>
+        </p:style>
+      </p:cxnSp>
+      <p:sp>
+        <p:nvSpPr>
+          <p:cNvPr id="2" name="Título 1"/>
+          <p:cNvSpPr>
+            <a:spLocks noGrp="1"/>
+          </p:cNvSpPr>
+          <p:nvPr>
+            <p:ph type="title"/>
+          </p:nvPr>
+        </p:nvSpPr>
+        <p:spPr>
+          <a:xfrm>
+            <a:off x="7859485" y="634946"/>
+            <a:ext cx="3690257" cy="1450757"/>
+          </a:xfrm>
+        </p:spPr>
+        <p:txBody>
+          <a:bodyPr>
+            <a:normAutofit/>
+          </a:bodyPr>
+          <a:lstStyle/>
+          <a:p>
+            <a:pPr>
+              <a:lnSpc>
+                <a:spcPct val="65000"/>
+              </a:lnSpc>
+            </a:pPr>
+            <a:r>
+              <a:rPr lang="pt-PT" sz="4100" b="1" dirty="0"/>
+              <a:t>Plano de desenvolvimento</a:t>
+            </a:r>
+            <a:r>
+              <a:rPr lang="pt-PT" sz="4100" dirty="0"/>
+              <a:t/>
+            </a:r>
+            <a:br>
+              <a:rPr lang="pt-PT" sz="4100" dirty="0"/>
+            </a:br>
+            <a:endParaRPr lang="pt-PT" sz="4100" dirty="0"/>
+          </a:p>
+        </p:txBody>
+      </p:sp>
+      <p:sp>
+        <p:nvSpPr>
+          <p:cNvPr id="11" name="Content Placeholder 10"/>
+          <p:cNvSpPr>
+            <a:spLocks noGrp="1"/>
+          </p:cNvSpPr>
+          <p:nvPr>
+            <p:ph idx="1"/>
+          </p:nvPr>
+        </p:nvSpPr>
+        <p:spPr>
+          <a:xfrm>
+            <a:off x="8389622" y="2206936"/>
+            <a:ext cx="2896686" cy="3670180"/>
+          </a:xfrm>
+        </p:spPr>
+        <p:txBody>
+          <a:bodyPr>
+            <a:normAutofit/>
+          </a:bodyPr>
+          <a:lstStyle/>
+          <a:p>
+            <a:r>
+              <a:rPr lang="en-US" dirty="0" smtClean="0"/>
+              <a:t>3 </a:t>
+            </a:r>
+            <a:r>
+              <a:rPr lang="en-US" dirty="0" err="1" smtClean="0"/>
+              <a:t>Etapas</a:t>
+            </a:r>
+            <a:r>
+              <a:rPr lang="en-US" dirty="0" smtClean="0"/>
+              <a:t> </a:t>
+            </a:r>
+            <a:r>
+              <a:rPr lang="en-US" dirty="0" err="1" smtClean="0"/>
+              <a:t>essenciais</a:t>
+            </a:r>
+            <a:r>
+              <a:rPr lang="en-US" dirty="0" smtClean="0"/>
+              <a:t>: </a:t>
+            </a:r>
+          </a:p>
+          <a:p>
+            <a:endParaRPr lang="en-US" dirty="0" smtClean="0"/>
+          </a:p>
+          <a:p>
+            <a:pPr>
+              <a:buClr>
+                <a:schemeClr val="accent1">
+                  <a:lumMod val="50000"/>
+                </a:schemeClr>
+              </a:buClr>
+              <a:buFont typeface="Wingdings" charset="2"/>
+              <a:buChar char="§"/>
+            </a:pPr>
+            <a:r>
+              <a:rPr lang="en-US" b="1" dirty="0" smtClean="0">
+                <a:solidFill>
+                  <a:schemeClr val="tx1"/>
+                </a:solidFill>
+              </a:rPr>
+              <a:t> </a:t>
+            </a:r>
+            <a:r>
+              <a:rPr lang="en-US" b="1" dirty="0" err="1" smtClean="0">
+                <a:solidFill>
+                  <a:schemeClr val="tx1"/>
+                </a:solidFill>
+              </a:rPr>
+              <a:t>Fundamentação</a:t>
+            </a:r>
+            <a:r>
+              <a:rPr lang="en-US" b="1" dirty="0" smtClean="0">
+                <a:solidFill>
+                  <a:schemeClr val="tx1"/>
+                </a:solidFill>
+              </a:rPr>
+              <a:t> </a:t>
+            </a:r>
+          </a:p>
+          <a:p>
+            <a:pPr>
+              <a:buClr>
+                <a:schemeClr val="accent1">
+                  <a:lumMod val="50000"/>
+                </a:schemeClr>
+              </a:buClr>
+              <a:buFont typeface="Wingdings" charset="2"/>
+              <a:buChar char="§"/>
+            </a:pPr>
+            <a:r>
+              <a:rPr lang="en-US" b="1" dirty="0" err="1" smtClean="0">
+                <a:solidFill>
+                  <a:schemeClr val="tx1"/>
+                </a:solidFill>
+              </a:rPr>
+              <a:t>Especificação</a:t>
+            </a:r>
+            <a:r>
+              <a:rPr lang="en-US" b="1" dirty="0" smtClean="0">
+                <a:solidFill>
+                  <a:schemeClr val="tx1"/>
+                </a:solidFill>
+              </a:rPr>
+              <a:t> </a:t>
+            </a:r>
+          </a:p>
+          <a:p>
+            <a:pPr>
+              <a:buClr>
+                <a:schemeClr val="accent1">
+                  <a:lumMod val="50000"/>
+                </a:schemeClr>
+              </a:buClr>
+              <a:buFont typeface="Wingdings" charset="2"/>
+              <a:buChar char="§"/>
+            </a:pPr>
+            <a:r>
+              <a:rPr lang="en-US" b="1" dirty="0" err="1" smtClean="0">
+                <a:solidFill>
+                  <a:schemeClr val="tx1"/>
+                </a:solidFill>
+              </a:rPr>
+              <a:t>Implementação</a:t>
+            </a:r>
+            <a:endParaRPr lang="en-US" b="1" dirty="0" smtClean="0">
+              <a:solidFill>
+                <a:schemeClr val="tx1"/>
+              </a:solidFill>
+            </a:endParaRPr>
+          </a:p>
+          <a:p>
+            <a:pPr>
+              <a:buClr>
+                <a:schemeClr val="accent1">
+                  <a:lumMod val="50000"/>
+                </a:schemeClr>
+              </a:buClr>
+              <a:buFont typeface="Wingdings" charset="2"/>
+              <a:buChar char="§"/>
+            </a:pPr>
+            <a:endParaRPr lang="en-US" b="1" dirty="0" smtClean="0">
+              <a:solidFill>
+                <a:schemeClr val="tx1"/>
+              </a:solidFill>
+            </a:endParaRPr>
+          </a:p>
+          <a:p>
+            <a:pPr marL="0" indent="0">
+              <a:buNone/>
+            </a:pPr>
+            <a:endParaRPr lang="en-US" dirty="0"/>
+          </a:p>
+        </p:txBody>
+      </p:sp>
+      <p:sp>
+        <p:nvSpPr>
+          <p:cNvPr id="3" name="Rectangle 2"/>
+          <p:cNvSpPr>
+            <a:spLocks noChangeArrowheads="1"/>
+          </p:cNvSpPr>
+          <p:nvPr/>
+        </p:nvSpPr>
+        <p:spPr bwMode="auto">
+          <a:xfrm>
+            <a:off x="-163688" y="1604278"/>
+            <a:ext cx="14835141" cy="457200"/>
+          </a:xfrm>
+          <a:prstGeom prst="rect">
+            <a:avLst/>
+          </a:prstGeom>
+          <a:noFill/>
+          <a:ln>
+            <a:noFill/>
+          </a:ln>
+          <a:effectLst/>
+          <a:extLst>
+            <a:ext uri="{909E8E84-426E-40DD-AFC4-6F175D3DCCD1}">
+              <a14:hiddenFill xmlns:a14="http://schemas.microsoft.com/office/drawing/2010/main">
+                <a:solidFill>
+                  <a:schemeClr val="accent1"/>
+                </a:solidFill>
+              </a14:hiddenFill>
+            </a:ext>
+            <a:ext uri="{91240B29-F687-4F45-9708-019B960494DF}">
+              <a14:hiddenLine xmlns:a14="http://schemas.microsoft.com/office/drawing/2010/main" w="9525">
+                <a:solidFill>
+                  <a:schemeClr val="tx1"/>
+                </a:solidFill>
+                <a:miter lim="800000"/>
+                <a:headEnd/>
+                <a:tailEnd/>
+              </a14:hiddenLine>
+            </a:ext>
+            <a:ext uri="{AF507438-7753-43E0-B8FC-AC1667EBCBE1}">
+              <a14:hiddenEffects xmlns:a14="http://schemas.microsoft.com/office/drawing/2010/main">
+                <a:effectLst>
+                  <a:outerShdw blurRad="63500" dist="38099" dir="2700000" algn="ctr" rotWithShape="0">
+                    <a:schemeClr val="bg2">
+                      <a:alpha val="74998"/>
+                    </a:schemeClr>
+                  </a:outerShdw>
+                </a:effectLst>
+              </a14:hiddenEffects>
+            </a:ext>
+          </a:extLst>
+        </p:spPr>
+        <p:txBody>
+          <a:bodyPr vert="horz" wrap="square" lIns="91440" tIns="45720" rIns="91440" bIns="45720" numCol="1" anchor="ctr" anchorCtr="0" compatLnSpc="1">
+            <a:prstTxWarp prst="textNoShape">
+              <a:avLst/>
+            </a:prstTxWarp>
+            <a:spAutoFit/>
+          </a:bodyPr>
+          <a:lstStyle/>
+          <a:p>
+            <a:endParaRPr lang="pt-PT"/>
+          </a:p>
+        </p:txBody>
+      </p:sp>
+      <p:pic>
+        <p:nvPicPr>
+          <p:cNvPr id="2049" name="Picture 1"/>
+          <p:cNvPicPr>
+            <a:picLocks noChangeAspect="1" noChangeArrowheads="1"/>
+          </p:cNvPicPr>
+          <p:nvPr/>
+        </p:nvPicPr>
+        <p:blipFill>
+          <a:blip r:embed="rId3">
+            <a:extLst>
+              <a:ext uri="{28A0092B-C50C-407E-A947-70E740481C1C}">
+                <a14:useLocalDpi xmlns:a14="http://schemas.microsoft.com/office/drawing/2010/main" val="0"/>
+              </a:ext>
+            </a:extLst>
+          </a:blip>
+          <a:srcRect/>
+          <a:stretch>
+            <a:fillRect/>
+          </a:stretch>
+        </p:blipFill>
+        <p:spPr bwMode="auto">
+          <a:xfrm>
+            <a:off x="287383" y="819808"/>
+            <a:ext cx="7480664" cy="4483712"/>
+          </a:xfrm>
+          <a:prstGeom prst="rect">
+            <a:avLst/>
+          </a:prstGeom>
+          <a:noFill/>
+          <a:extLst>
+            <a:ext uri="{909E8E84-426E-40DD-AFC4-6F175D3DCCD1}">
+              <a14:hiddenFill xmlns:a14="http://schemas.microsoft.com/office/drawing/2010/main">
+                <a:solidFill>
+                  <a:srgbClr val="FFFFFF"/>
+                </a:solidFill>
+              </a14:hiddenFill>
+            </a:ext>
+          </a:extLst>
+        </p:spPr>
+      </p:pic>
+    </p:spTree>
+    <p:extLst>
+      <p:ext uri="{BB962C8B-B14F-4D97-AF65-F5344CB8AC3E}">
+        <p14:creationId xmlns:p14="http://schemas.microsoft.com/office/powerpoint/2010/main" val="385028416"/>
+      </p:ext>
+    </p:extLst>
+  </p:cSld>
+  <p:clrMapOvr>
+    <a:masterClrMapping/>
+  </p:clrMapOvr>
+  <p:timing>
+    <p:tnLst>
+      <p:par>
+        <p:cTn id="1" dur="indefinite" restart="never" nodeType="tmRoot"/>
+      </p:par>
+    </p:tnLst>
+  </p:timing>
+</p:sld>
+</file>
+
+<file path=ppt/slides/slide13.xml><?xml version="1.0" encoding="utf-8"?>
+<p:sld xmlns:a="http://schemas.openxmlformats.org/drawingml/2006/main" xmlns:r="http://schemas.openxmlformats.org/officeDocument/2006/relationships" xmlns:p="http://schemas.openxmlformats.org/presentationml/2006/main">
+  <p:cSld>
+    <p:spTree>
+      <p:nvGrpSpPr>
+        <p:cNvPr id="1" name=""/>
+        <p:cNvGrpSpPr/>
+        <p:nvPr/>
+      </p:nvGrpSpPr>
+      <p:grpSpPr>
+        <a:xfrm>
+          <a:off x="0" y="0"/>
+          <a:ext cx="0" cy="0"/>
+          <a:chOff x="0" y="0"/>
+          <a:chExt cx="0" cy="0"/>
+        </a:xfrm>
+      </p:grpSpPr>
+      <p:sp>
+        <p:nvSpPr>
+          <p:cNvPr id="2" name="Título 1"/>
+          <p:cNvSpPr>
+            <a:spLocks noGrp="1"/>
+          </p:cNvSpPr>
+          <p:nvPr>
+            <p:ph type="title"/>
+          </p:nvPr>
+        </p:nvSpPr>
+        <p:spPr/>
+        <p:txBody>
+          <a:bodyPr/>
+          <a:lstStyle/>
+          <a:p>
+            <a:endParaRPr lang="pt-PT" dirty="0"/>
+          </a:p>
+        </p:txBody>
+      </p:sp>
+      <p:sp>
+        <p:nvSpPr>
+          <p:cNvPr id="3" name="Marcador de Posição de Conteúdo 2"/>
+          <p:cNvSpPr>
+            <a:spLocks noGrp="1"/>
+          </p:cNvSpPr>
+          <p:nvPr>
+            <p:ph idx="1"/>
+          </p:nvPr>
+        </p:nvSpPr>
+        <p:spPr>
+          <a:xfrm>
+            <a:off x="1097280" y="1845733"/>
+            <a:ext cx="10058400" cy="4724399"/>
+          </a:xfrm>
+        </p:spPr>
+        <p:txBody>
+          <a:bodyPr numCol="3" spcCol="36000">
+            <a:normAutofit fontScale="62500" lnSpcReduction="20000"/>
+          </a:bodyPr>
+          <a:lstStyle/>
+          <a:p>
+            <a:r>
+              <a:rPr lang="pt-PT" dirty="0"/>
+              <a:t>1) </a:t>
+            </a:r>
+            <a:br>
+              <a:rPr lang="pt-PT" dirty="0"/>
+            </a:br>
+            <a:r>
+              <a:rPr lang="pt-PT" dirty="0"/>
+              <a:t> A </a:t>
+            </a:r>
+            <a:br>
+              <a:rPr lang="pt-PT" dirty="0"/>
+            </a:br>
+            <a:r>
+              <a:rPr lang="pt-PT" dirty="0"/>
+              <a:t> apresentação </a:t>
+            </a:r>
+            <a:br>
+              <a:rPr lang="pt-PT" dirty="0"/>
+            </a:br>
+            <a:r>
+              <a:rPr lang="pt-PT" dirty="0"/>
+              <a:t> e </a:t>
+            </a:r>
+            <a:br>
+              <a:rPr lang="pt-PT" dirty="0"/>
+            </a:br>
+            <a:r>
+              <a:rPr lang="pt-PT" dirty="0"/>
+              <a:t> a </a:t>
+            </a:r>
+            <a:br>
+              <a:rPr lang="pt-PT" dirty="0"/>
+            </a:br>
+            <a:r>
+              <a:rPr lang="pt-PT" dirty="0"/>
+              <a:t> contextualização </a:t>
+            </a:r>
+            <a:br>
+              <a:rPr lang="pt-PT" dirty="0"/>
+            </a:br>
+            <a:r>
+              <a:rPr lang="pt-PT" dirty="0"/>
+              <a:t> do </a:t>
+            </a:r>
+            <a:br>
+              <a:rPr lang="pt-PT" dirty="0"/>
+            </a:br>
+            <a:r>
+              <a:rPr lang="pt-PT" dirty="0"/>
+              <a:t> problema </a:t>
+            </a:r>
+            <a:br>
+              <a:rPr lang="pt-PT" dirty="0"/>
+            </a:br>
+            <a:r>
+              <a:rPr lang="pt-PT" dirty="0"/>
+              <a:t> foi </a:t>
+            </a:r>
+            <a:br>
+              <a:rPr lang="pt-PT" dirty="0"/>
+            </a:br>
+            <a:r>
+              <a:rPr lang="pt-PT" dirty="0"/>
+              <a:t> apresentada </a:t>
+            </a:r>
+            <a:br>
+              <a:rPr lang="pt-PT" dirty="0"/>
+            </a:br>
+            <a:r>
+              <a:rPr lang="pt-PT" dirty="0"/>
+              <a:t> de </a:t>
+            </a:r>
+            <a:br>
+              <a:rPr lang="pt-PT" dirty="0"/>
+            </a:br>
+            <a:r>
+              <a:rPr lang="pt-PT" dirty="0"/>
+              <a:t> forma </a:t>
+            </a:r>
+            <a:br>
+              <a:rPr lang="pt-PT" dirty="0"/>
+            </a:br>
+            <a:r>
+              <a:rPr lang="pt-PT" dirty="0"/>
+              <a:t> clara?</a:t>
+            </a:r>
+          </a:p>
+          <a:p>
+            <a:r>
+              <a:rPr lang="pt-PT" dirty="0"/>
+              <a:t>2) </a:t>
+            </a:r>
+            <a:br>
+              <a:rPr lang="pt-PT" dirty="0"/>
+            </a:br>
+            <a:r>
+              <a:rPr lang="pt-PT" dirty="0"/>
+              <a:t> A </a:t>
+            </a:r>
+            <a:br>
+              <a:rPr lang="pt-PT" dirty="0"/>
+            </a:br>
+            <a:r>
+              <a:rPr lang="pt-PT" dirty="0"/>
+              <a:t> motivação </a:t>
+            </a:r>
+            <a:br>
+              <a:rPr lang="pt-PT" dirty="0"/>
+            </a:br>
+            <a:r>
+              <a:rPr lang="pt-PT" dirty="0"/>
+              <a:t> e </a:t>
+            </a:r>
+            <a:br>
+              <a:rPr lang="pt-PT" dirty="0"/>
+            </a:br>
+            <a:r>
+              <a:rPr lang="pt-PT" dirty="0"/>
+              <a:t> os </a:t>
+            </a:r>
+            <a:br>
+              <a:rPr lang="pt-PT" dirty="0"/>
+            </a:br>
+            <a:r>
+              <a:rPr lang="pt-PT" dirty="0"/>
+              <a:t> </a:t>
+            </a:r>
+            <a:r>
+              <a:rPr lang="pt-PT" dirty="0" err="1"/>
+              <a:t>objectivos</a:t>
+            </a:r>
+            <a:r>
+              <a:rPr lang="pt-PT" dirty="0"/>
+              <a:t> </a:t>
+            </a:r>
+            <a:br>
+              <a:rPr lang="pt-PT" dirty="0"/>
+            </a:br>
+            <a:r>
+              <a:rPr lang="pt-PT" dirty="0"/>
+              <a:t> do </a:t>
+            </a:r>
+            <a:br>
+              <a:rPr lang="pt-PT" dirty="0"/>
+            </a:br>
+            <a:r>
+              <a:rPr lang="pt-PT" dirty="0"/>
+              <a:t> problema </a:t>
+            </a:r>
+            <a:br>
+              <a:rPr lang="pt-PT" dirty="0"/>
+            </a:br>
+            <a:r>
+              <a:rPr lang="pt-PT" dirty="0"/>
+              <a:t> foram </a:t>
+            </a:r>
+            <a:br>
+              <a:rPr lang="pt-PT" dirty="0"/>
+            </a:br>
+            <a:r>
+              <a:rPr lang="pt-PT" dirty="0"/>
+              <a:t> bem </a:t>
+            </a:r>
+            <a:br>
+              <a:rPr lang="pt-PT" dirty="0"/>
+            </a:br>
+            <a:r>
+              <a:rPr lang="pt-PT" dirty="0"/>
+              <a:t> definidos </a:t>
+            </a:r>
+            <a:br>
+              <a:rPr lang="pt-PT" dirty="0"/>
+            </a:br>
+            <a:r>
+              <a:rPr lang="pt-PT" dirty="0"/>
+              <a:t> e </a:t>
+            </a:r>
+            <a:br>
+              <a:rPr lang="pt-PT" dirty="0"/>
+            </a:br>
+            <a:r>
+              <a:rPr lang="pt-PT" dirty="0"/>
+              <a:t> expostos?</a:t>
+            </a:r>
+          </a:p>
+          <a:p>
+            <a:r>
+              <a:rPr lang="pt-PT" dirty="0"/>
+              <a:t>3) </a:t>
+            </a:r>
+            <a:br>
+              <a:rPr lang="pt-PT" dirty="0"/>
+            </a:br>
+            <a:r>
+              <a:rPr lang="pt-PT" dirty="0"/>
+              <a:t> Houve </a:t>
+            </a:r>
+            <a:br>
+              <a:rPr lang="pt-PT" dirty="0"/>
+            </a:br>
+            <a:r>
+              <a:rPr lang="pt-PT" dirty="0"/>
+              <a:t> o </a:t>
+            </a:r>
+            <a:br>
+              <a:rPr lang="pt-PT" dirty="0"/>
+            </a:br>
+            <a:r>
+              <a:rPr lang="pt-PT" dirty="0"/>
+              <a:t> cuidado </a:t>
+            </a:r>
+            <a:br>
+              <a:rPr lang="pt-PT" dirty="0"/>
+            </a:br>
+            <a:r>
+              <a:rPr lang="pt-PT" dirty="0"/>
+              <a:t> de </a:t>
+            </a:r>
+            <a:br>
+              <a:rPr lang="pt-PT" dirty="0"/>
+            </a:br>
+            <a:r>
+              <a:rPr lang="pt-PT" dirty="0"/>
+              <a:t> caracterizar </a:t>
+            </a:r>
+            <a:br>
+              <a:rPr lang="pt-PT" dirty="0"/>
+            </a:br>
+            <a:r>
+              <a:rPr lang="pt-PT" dirty="0"/>
+              <a:t> um </a:t>
+            </a:r>
+            <a:br>
+              <a:rPr lang="pt-PT" dirty="0"/>
+            </a:br>
+            <a:r>
+              <a:rPr lang="pt-PT" dirty="0"/>
+              <a:t> eventual </a:t>
+            </a:r>
+            <a:br>
+              <a:rPr lang="pt-PT" dirty="0"/>
+            </a:br>
+            <a:r>
+              <a:rPr lang="pt-PT" dirty="0"/>
+              <a:t> cliente </a:t>
+            </a:r>
+            <a:br>
+              <a:rPr lang="pt-PT" dirty="0"/>
+            </a:br>
+            <a:r>
+              <a:rPr lang="pt-PT" dirty="0"/>
+              <a:t> para </a:t>
+            </a:r>
+            <a:br>
+              <a:rPr lang="pt-PT" dirty="0"/>
+            </a:br>
+            <a:r>
+              <a:rPr lang="pt-PT" dirty="0"/>
+              <a:t> a </a:t>
+            </a:r>
+            <a:br>
+              <a:rPr lang="pt-PT" dirty="0"/>
+            </a:br>
+            <a:r>
+              <a:rPr lang="pt-PT" dirty="0"/>
+              <a:t> aplicação </a:t>
+            </a:r>
+            <a:br>
+              <a:rPr lang="pt-PT" dirty="0"/>
+            </a:br>
+            <a:r>
+              <a:rPr lang="pt-PT" dirty="0"/>
+              <a:t> proposta?</a:t>
+            </a:r>
+          </a:p>
+          <a:p>
+            <a:r>
+              <a:rPr lang="pt-PT" dirty="0"/>
+              <a:t>4) </a:t>
+            </a:r>
+            <a:br>
+              <a:rPr lang="pt-PT" dirty="0"/>
+            </a:br>
+            <a:r>
+              <a:rPr lang="pt-PT" dirty="0"/>
+              <a:t> Os </a:t>
+            </a:r>
+            <a:br>
+              <a:rPr lang="pt-PT" dirty="0"/>
+            </a:br>
+            <a:r>
+              <a:rPr lang="pt-PT" dirty="0"/>
+              <a:t> serviços </a:t>
+            </a:r>
+            <a:br>
+              <a:rPr lang="pt-PT" dirty="0"/>
+            </a:br>
+            <a:r>
+              <a:rPr lang="pt-PT" dirty="0"/>
+              <a:t> da </a:t>
+            </a:r>
+            <a:br>
+              <a:rPr lang="pt-PT" dirty="0"/>
+            </a:br>
+            <a:r>
+              <a:rPr lang="pt-PT" dirty="0"/>
+              <a:t> futura </a:t>
+            </a:r>
+            <a:br>
+              <a:rPr lang="pt-PT" dirty="0"/>
+            </a:br>
+            <a:r>
+              <a:rPr lang="pt-PT" dirty="0"/>
+              <a:t> aplicação </a:t>
+            </a:r>
+            <a:br>
+              <a:rPr lang="pt-PT" dirty="0"/>
+            </a:br>
+            <a:r>
+              <a:rPr lang="pt-PT" dirty="0"/>
+              <a:t> foram </a:t>
+            </a:r>
+            <a:br>
+              <a:rPr lang="pt-PT" dirty="0"/>
+            </a:br>
+            <a:r>
+              <a:rPr lang="pt-PT" dirty="0"/>
+              <a:t> bem </a:t>
+            </a:r>
+            <a:br>
+              <a:rPr lang="pt-PT" dirty="0"/>
+            </a:br>
+            <a:r>
+              <a:rPr lang="pt-PT" dirty="0"/>
+              <a:t> apresentados?</a:t>
+            </a:r>
+          </a:p>
+          <a:p>
+            <a:r>
+              <a:rPr lang="pt-PT" dirty="0"/>
+              <a:t>5) </a:t>
+            </a:r>
+            <a:br>
+              <a:rPr lang="pt-PT" dirty="0"/>
+            </a:br>
+            <a:r>
+              <a:rPr lang="pt-PT" dirty="0"/>
+              <a:t> Houve </a:t>
+            </a:r>
+            <a:br>
+              <a:rPr lang="pt-PT" dirty="0"/>
+            </a:br>
+            <a:r>
+              <a:rPr lang="pt-PT" dirty="0"/>
+              <a:t> a </a:t>
+            </a:r>
+            <a:br>
+              <a:rPr lang="pt-PT" dirty="0"/>
+            </a:br>
+            <a:r>
+              <a:rPr lang="pt-PT" dirty="0"/>
+              <a:t> preocupação </a:t>
+            </a:r>
+            <a:br>
+              <a:rPr lang="pt-PT" dirty="0"/>
+            </a:br>
+            <a:r>
+              <a:rPr lang="pt-PT" dirty="0"/>
+              <a:t> de </a:t>
+            </a:r>
+            <a:br>
+              <a:rPr lang="pt-PT" dirty="0"/>
+            </a:br>
+            <a:r>
+              <a:rPr lang="pt-PT" dirty="0"/>
+              <a:t> caracterizar </a:t>
+            </a:r>
+            <a:br>
+              <a:rPr lang="pt-PT" dirty="0"/>
+            </a:br>
+            <a:r>
+              <a:rPr lang="pt-PT" dirty="0"/>
+              <a:t> cada </a:t>
+            </a:r>
+            <a:br>
+              <a:rPr lang="pt-PT" dirty="0"/>
+            </a:br>
+            <a:r>
+              <a:rPr lang="pt-PT" dirty="0"/>
+              <a:t> um </a:t>
+            </a:r>
+            <a:br>
+              <a:rPr lang="pt-PT" dirty="0"/>
+            </a:br>
+            <a:r>
+              <a:rPr lang="pt-PT" dirty="0"/>
+              <a:t> dos </a:t>
+            </a:r>
+            <a:br>
+              <a:rPr lang="pt-PT" dirty="0"/>
+            </a:br>
+            <a:r>
+              <a:rPr lang="pt-PT" dirty="0"/>
+              <a:t> serviços </a:t>
+            </a:r>
+            <a:br>
+              <a:rPr lang="pt-PT" dirty="0"/>
+            </a:br>
+            <a:r>
+              <a:rPr lang="pt-PT" dirty="0"/>
+              <a:t> apresentados?</a:t>
+            </a:r>
+          </a:p>
+          <a:p>
+            <a:r>
+              <a:rPr lang="pt-PT" dirty="0"/>
+              <a:t>6) </a:t>
+            </a:r>
+            <a:br>
+              <a:rPr lang="pt-PT" dirty="0"/>
+            </a:br>
+            <a:r>
+              <a:rPr lang="pt-PT" dirty="0"/>
+              <a:t> A </a:t>
+            </a:r>
+            <a:br>
+              <a:rPr lang="pt-PT" dirty="0"/>
+            </a:br>
+            <a:r>
+              <a:rPr lang="pt-PT" dirty="0"/>
+              <a:t> qualidade </a:t>
+            </a:r>
+            <a:br>
+              <a:rPr lang="pt-PT" dirty="0"/>
+            </a:br>
+            <a:r>
+              <a:rPr lang="pt-PT" dirty="0"/>
+              <a:t> da </a:t>
+            </a:r>
+            <a:br>
+              <a:rPr lang="pt-PT" dirty="0"/>
+            </a:br>
+            <a:r>
+              <a:rPr lang="pt-PT" dirty="0"/>
+              <a:t> planificação </a:t>
+            </a:r>
+            <a:br>
+              <a:rPr lang="pt-PT" dirty="0"/>
+            </a:br>
+            <a:r>
+              <a:rPr lang="pt-PT" dirty="0"/>
+              <a:t> realizada </a:t>
+            </a:r>
+            <a:br>
+              <a:rPr lang="pt-PT" dirty="0"/>
+            </a:br>
+            <a:r>
+              <a:rPr lang="pt-PT" dirty="0"/>
+              <a:t> está </a:t>
+            </a:r>
+            <a:br>
+              <a:rPr lang="pt-PT" dirty="0"/>
+            </a:br>
+            <a:r>
+              <a:rPr lang="pt-PT" dirty="0"/>
+              <a:t> de </a:t>
+            </a:r>
+            <a:br>
+              <a:rPr lang="pt-PT" dirty="0"/>
+            </a:br>
+            <a:r>
+              <a:rPr lang="pt-PT" dirty="0"/>
+              <a:t> acordo </a:t>
+            </a:r>
+            <a:br>
+              <a:rPr lang="pt-PT" dirty="0"/>
+            </a:br>
+            <a:r>
+              <a:rPr lang="pt-PT" dirty="0"/>
+              <a:t> com </a:t>
+            </a:r>
+            <a:br>
+              <a:rPr lang="pt-PT" dirty="0"/>
+            </a:br>
+            <a:r>
+              <a:rPr lang="pt-PT" dirty="0"/>
+              <a:t> o </a:t>
+            </a:r>
+            <a:br>
+              <a:rPr lang="pt-PT" dirty="0"/>
+            </a:br>
+            <a:r>
+              <a:rPr lang="pt-PT" dirty="0"/>
+              <a:t> projeto </a:t>
+            </a:r>
+            <a:br>
+              <a:rPr lang="pt-PT" dirty="0"/>
+            </a:br>
+            <a:r>
+              <a:rPr lang="pt-PT" dirty="0"/>
+              <a:t> em </a:t>
+            </a:r>
+            <a:br>
+              <a:rPr lang="pt-PT" dirty="0"/>
+            </a:br>
+            <a:r>
+              <a:rPr lang="pt-PT" dirty="0"/>
+              <a:t> causa?</a:t>
+            </a:r>
+          </a:p>
+          <a:p>
+            <a:r>
+              <a:rPr lang="pt-PT" dirty="0"/>
+              <a:t>7) </a:t>
+            </a:r>
+            <a:br>
+              <a:rPr lang="pt-PT" dirty="0"/>
+            </a:br>
+            <a:r>
+              <a:rPr lang="pt-PT" dirty="0"/>
+              <a:t> A </a:t>
+            </a:r>
+            <a:br>
+              <a:rPr lang="pt-PT" dirty="0"/>
+            </a:br>
+            <a:r>
+              <a:rPr lang="pt-PT" dirty="0"/>
+              <a:t> qualidade </a:t>
+            </a:r>
+            <a:br>
+              <a:rPr lang="pt-PT" dirty="0"/>
+            </a:br>
+            <a:r>
+              <a:rPr lang="pt-PT" dirty="0"/>
+              <a:t> geral </a:t>
+            </a:r>
+            <a:br>
+              <a:rPr lang="pt-PT" dirty="0"/>
+            </a:br>
+            <a:r>
+              <a:rPr lang="pt-PT" dirty="0"/>
+              <a:t> da </a:t>
+            </a:r>
+            <a:br>
+              <a:rPr lang="pt-PT" dirty="0"/>
+            </a:br>
+            <a:r>
+              <a:rPr lang="pt-PT" dirty="0"/>
+              <a:t> apresentação </a:t>
+            </a:r>
+            <a:br>
+              <a:rPr lang="pt-PT" dirty="0"/>
+            </a:br>
+            <a:r>
+              <a:rPr lang="pt-PT" dirty="0"/>
+              <a:t> realizada </a:t>
+            </a:r>
+            <a:br>
+              <a:rPr lang="pt-PT" dirty="0"/>
+            </a:br>
+            <a:r>
+              <a:rPr lang="pt-PT" dirty="0"/>
+              <a:t> está </a:t>
+            </a:r>
+            <a:br>
+              <a:rPr lang="pt-PT" dirty="0"/>
+            </a:br>
+            <a:r>
+              <a:rPr lang="pt-PT" dirty="0"/>
+              <a:t> de </a:t>
+            </a:r>
+            <a:br>
+              <a:rPr lang="pt-PT" dirty="0"/>
+            </a:br>
+            <a:r>
+              <a:rPr lang="pt-PT" dirty="0"/>
+              <a:t> acordo </a:t>
+            </a:r>
+            <a:br>
+              <a:rPr lang="pt-PT" dirty="0"/>
+            </a:br>
+            <a:r>
+              <a:rPr lang="pt-PT" dirty="0"/>
+              <a:t> com </a:t>
+            </a:r>
+            <a:br>
+              <a:rPr lang="pt-PT" dirty="0"/>
+            </a:br>
+            <a:r>
+              <a:rPr lang="pt-PT" dirty="0"/>
+              <a:t> o </a:t>
+            </a:r>
+            <a:br>
+              <a:rPr lang="pt-PT" dirty="0"/>
+            </a:br>
+            <a:r>
+              <a:rPr lang="pt-PT" dirty="0"/>
+              <a:t> projeto </a:t>
+            </a:r>
+            <a:br>
+              <a:rPr lang="pt-PT" dirty="0"/>
+            </a:br>
+            <a:r>
+              <a:rPr lang="pt-PT" dirty="0"/>
+              <a:t> em </a:t>
+            </a:r>
+            <a:br>
+              <a:rPr lang="pt-PT" dirty="0"/>
+            </a:br>
+            <a:r>
+              <a:rPr lang="pt-PT" dirty="0"/>
+              <a:t> causa?</a:t>
+            </a:r>
+          </a:p>
+          <a:p>
+            <a:endParaRPr lang="pt-PT" dirty="0"/>
+          </a:p>
+        </p:txBody>
+      </p:sp>
+    </p:spTree>
+    <p:extLst>
+      <p:ext uri="{BB962C8B-B14F-4D97-AF65-F5344CB8AC3E}">
+        <p14:creationId xmlns:p14="http://schemas.microsoft.com/office/powerpoint/2010/main" val="355919761"/>
+      </p:ext>
+    </p:extLst>
+  </p:cSld>
+  <p:clrMapOvr>
+    <a:masterClrMapping/>
+  </p:clrMapOvr>
+  <p:timing>
+    <p:tnLst>
+      <p:par>
+        <p:cTn id="1" dur="indefinite" restart="never" nodeType="tmRoot"/>
+      </p:par>
+    </p:tnLst>
+  </p:timing>
+</p:sld>
+</file>
+
+<file path=ppt/slides/slide14.xml><?xml version="1.0" encoding="utf-8"?>
+<p:sld xmlns:a="http://schemas.openxmlformats.org/drawingml/2006/main" xmlns:r="http://schemas.openxmlformats.org/officeDocument/2006/relationships" xmlns:p="http://schemas.openxmlformats.org/presentationml/2006/main">
+  <p:cSld>
+    <p:spTree>
+      <p:nvGrpSpPr>
+        <p:cNvPr id="1" name=""/>
+        <p:cNvGrpSpPr/>
+        <p:nvPr/>
+      </p:nvGrpSpPr>
+      <p:grpSpPr>
+        <a:xfrm>
+          <a:off x="0" y="0"/>
+          <a:ext cx="0" cy="0"/>
+          <a:chOff x="0" y="0"/>
+          <a:chExt cx="0" cy="0"/>
+        </a:xfrm>
+      </p:grpSpPr>
       <p:sp>
         <p:nvSpPr>
           <p:cNvPr id="2" name="Título 1"/>
@@ -5308,7 +6858,7 @@
         </p:blipFill>
         <p:spPr>
           <a:xfrm>
-            <a:off x="0" y="0"/>
+            <a:off x="249766" y="125260"/>
             <a:ext cx="1837267" cy="1490795"/>
           </a:xfrm>
           <a:prstGeom prst="rect">
@@ -5659,6 +7209,70 @@
           <a:bodyPr/>
           <a:lstStyle/>
           <a:p>
+            <a:r>
+              <a:rPr lang="pt-PT" dirty="0"/>
+              <a:t>O passatempo de comer em restaurantes é aproveitado por uma grande variedade de </a:t>
+            </a:r>
+            <a:r>
+              <a:rPr lang="pt-PT" dirty="0" smtClean="0"/>
+              <a:t>pessoas. </a:t>
+            </a:r>
+            <a:r>
+              <a:rPr lang="pt-PT" dirty="0"/>
+              <a:t>Existem vários tipos de restaurantes - alguns de </a:t>
+            </a:r>
+            <a:r>
+              <a:rPr lang="pt-PT" dirty="0" err="1"/>
+              <a:t>fast</a:t>
+            </a:r>
+            <a:r>
+              <a:rPr lang="pt-PT" dirty="0"/>
+              <a:t> </a:t>
+            </a:r>
+            <a:r>
+              <a:rPr lang="pt-PT" dirty="0" err="1"/>
+              <a:t>food</a:t>
+            </a:r>
+            <a:r>
+              <a:rPr lang="pt-PT" dirty="0"/>
+              <a:t>, outros de alta gastronomia e ainda de comida casual, entre outros. Cada tipo oferece um tipo diferente de serviço ou cozinha e pode atrair clientelas </a:t>
+            </a:r>
+            <a:r>
+              <a:rPr lang="pt-PT" dirty="0" smtClean="0"/>
+              <a:t>diferentes. </a:t>
+            </a:r>
+          </a:p>
+          <a:p>
+            <a:r>
+              <a:rPr lang="pt-PT" dirty="0"/>
+              <a:t>Com base nestas premissas surgiu a ideia de colocar alguns restaurantes numa base de dados com as suas respetivas ementas e sempre que </a:t>
+            </a:r>
+            <a:r>
+              <a:rPr lang="pt-PT" dirty="0" smtClean="0"/>
+              <a:t>chegasse </a:t>
+            </a:r>
+            <a:r>
+              <a:rPr lang="pt-PT" dirty="0"/>
+              <a:t>a hora sagrada da alimentação aconchegada com desejo de comer </a:t>
+            </a:r>
+            <a:r>
+              <a:rPr lang="pt-PT" dirty="0" smtClean="0"/>
+              <a:t>‘alguma coisa’ desejada teríamos uma aplicação que ajudasse a encontrar o local com a tal iguaria desejada. </a:t>
+            </a:r>
+            <a:r>
+              <a:rPr lang="pt-PT" dirty="0"/>
+              <a:t>Posto isto </a:t>
+            </a:r>
+            <a:r>
+              <a:rPr lang="pt-PT" dirty="0" smtClean="0"/>
+              <a:t>surgiu </a:t>
+            </a:r>
+            <a:r>
+              <a:rPr lang="pt-PT" dirty="0"/>
+              <a:t>a ideia de criar uma aplicação que nos ajudasse nesse sentido. </a:t>
+            </a:r>
+          </a:p>
+          <a:p>
             <a:endParaRPr lang="pt-PT" dirty="0"/>
           </a:p>
         </p:txBody>
@@ -5710,62 +7324,116 @@
             <p:ph type="title"/>
           </p:nvPr>
         </p:nvSpPr>
-        <p:spPr/>
+        <p:spPr>
+          <a:xfrm>
+            <a:off x="1097280" y="286604"/>
+            <a:ext cx="10058400" cy="1216520"/>
+          </a:xfrm>
+        </p:spPr>
         <p:txBody>
           <a:bodyPr/>
           <a:lstStyle/>
           <a:p>
             <a:r>
-              <a:rPr lang="pt-PT" b="1" dirty="0"/>
-              <a:t>Motivação e objetivos</a:t>
-            </a:r>
-            <a:r>
-              <a:rPr lang="pt-PT" dirty="0"/>
-              <a:t/>
-            </a:r>
-            <a:br>
-              <a:rPr lang="pt-PT" dirty="0"/>
-            </a:br>
+              <a:rPr lang="pt-PT" b="1" dirty="0" smtClean="0"/>
+              <a:t>Apresentação do caso de estudo </a:t>
+            </a:r>
+            <a:endParaRPr lang="pt-PT" b="1" dirty="0"/>
+          </a:p>
+        </p:txBody>
+      </p:sp>
+      <p:sp>
+        <p:nvSpPr>
+          <p:cNvPr id="3" name="Marcador de Posição de Conteúdo 2"/>
+          <p:cNvSpPr>
+            <a:spLocks noGrp="1"/>
+          </p:cNvSpPr>
+          <p:nvPr>
+            <p:ph idx="1"/>
+          </p:nvPr>
+        </p:nvSpPr>
+        <p:spPr/>
+        <p:txBody>
+          <a:bodyPr>
+            <a:normAutofit/>
+          </a:bodyPr>
+          <a:lstStyle/>
+          <a:p>
+            <a:pPr fontAlgn="base"/>
+            <a:r>
+              <a:rPr lang="pt-PT" dirty="0"/>
+              <a:t>A aplicação deverá ser capaz de satisfazer os seguintes requisitos: </a:t>
+            </a:r>
+            <a:endParaRPr lang="pt-PT" dirty="0" smtClean="0"/>
+          </a:p>
+          <a:p>
+            <a:pPr fontAlgn="base"/>
             <a:endParaRPr lang="pt-PT" dirty="0"/>
           </a:p>
-        </p:txBody>
-      </p:sp>
-      <p:sp>
-        <p:nvSpPr>
-          <p:cNvPr id="3" name="Marcador de Posição de Conteúdo 2"/>
-          <p:cNvSpPr>
-            <a:spLocks noGrp="1"/>
-          </p:cNvSpPr>
-          <p:nvPr>
-            <p:ph idx="1"/>
-          </p:nvPr>
-        </p:nvSpPr>
-        <p:spPr/>
-        <p:txBody>
-          <a:bodyPr/>
-          <a:lstStyle/>
-          <a:p>
-            <a:endParaRPr lang="pt-PT"/>
+          <a:p>
+            <a:pPr lvl="0" algn="just" fontAlgn="base">
+              <a:buFont typeface="Wingdings" charset="2"/>
+              <a:buChar char="§"/>
+            </a:pPr>
+            <a:r>
+              <a:rPr lang="pt-PT" dirty="0"/>
+              <a:t>Permitir que o utilizador dite o que quer comer no momento, quer por escrito, quer por voz; </a:t>
+            </a:r>
+          </a:p>
+          <a:p>
+            <a:pPr lvl="0" algn="just" fontAlgn="base">
+              <a:buFont typeface="Wingdings" charset="2"/>
+              <a:buChar char="§"/>
+            </a:pPr>
+            <a:r>
+              <a:rPr lang="pt-PT" dirty="0"/>
+              <a:t>Apresentar uma lista de sugestões de locais, ordenadas de acordo com um dado índice de avaliação, cada local acompanhado por uma caracterização, relatos de clientes, formas de contactos, localização do local e forma de lá chegar através da visualização do caminho num mapa, assim como uma descrição, fotografia e preço do "algo" pretendido; </a:t>
+            </a:r>
+          </a:p>
+          <a:p>
+            <a:pPr lvl="0" algn="just" fontAlgn="base">
+              <a:buFont typeface="Wingdings" charset="2"/>
+              <a:buChar char="§"/>
+            </a:pPr>
+            <a:r>
+              <a:rPr lang="pt-PT" dirty="0"/>
+              <a:t> </a:t>
+            </a:r>
+            <a:r>
+              <a:rPr lang="pt-PT" dirty="0"/>
+              <a:t>Permitir ao utilizador registar a sua opinião sobre o local selecionado e o "algo" degustado, possibilitando-o publicar a respetiva opinião numa rede social, assim como "</a:t>
+            </a:r>
+            <a:r>
+              <a:rPr lang="pt-PT" dirty="0" err="1"/>
+              <a:t>twittar</a:t>
+            </a:r>
+            <a:r>
+              <a:rPr lang="pt-PT" dirty="0"/>
+              <a:t>" a experiência de degustação em tempo real; </a:t>
+            </a:r>
+          </a:p>
+          <a:p>
+            <a:pPr fontAlgn="base">
+              <a:buFont typeface="Wingdings" charset="2"/>
+              <a:buChar char="§"/>
+            </a:pPr>
+            <a:endParaRPr lang="pt-PT" dirty="0"/>
+          </a:p>
+          <a:p>
+            <a:endParaRPr lang="pt-PT" dirty="0"/>
           </a:p>
         </p:txBody>
       </p:sp>
     </p:spTree>
     <p:extLst>
       <p:ext uri="{BB962C8B-B14F-4D97-AF65-F5344CB8AC3E}">
-        <p14:creationId xmlns:p14="http://schemas.microsoft.com/office/powerpoint/2010/main" val="795367"/>
+        <p14:creationId xmlns:p14="http://schemas.microsoft.com/office/powerpoint/2010/main" val="1415584678"/>
       </p:ext>
     </p:extLst>
   </p:cSld>
   <p:clrMapOvr>
     <a:masterClrMapping/>
   </p:clrMapOvr>
-  <p:timing>
-    <p:tnLst>
-      <p:par>
-        <p:cTn id="1" dur="indefinite" restart="never" nodeType="tmRoot"/>
-      </p:par>
-    </p:tnLst>
-  </p:timing>
 </p:sld>
 </file>
 
@@ -5796,22 +7464,20 @@
             <p:ph type="title"/>
           </p:nvPr>
         </p:nvSpPr>
-        <p:spPr/>
+        <p:spPr>
+          <a:xfrm>
+            <a:off x="1097280" y="286604"/>
+            <a:ext cx="10058400" cy="1091260"/>
+          </a:xfrm>
+        </p:spPr>
         <p:txBody>
           <a:bodyPr/>
           <a:lstStyle/>
           <a:p>
             <a:r>
               <a:rPr lang="pt-PT" b="1" dirty="0"/>
-              <a:t>Justificação do sistema</a:t>
-            </a:r>
-            <a:r>
-              <a:rPr lang="pt-PT" dirty="0"/>
-              <a:t/>
-            </a:r>
-            <a:br>
-              <a:rPr lang="pt-PT" dirty="0"/>
-            </a:br>
+              <a:t>Apresentação do caso de estudo </a:t>
+            </a:r>
             <a:endParaRPr lang="pt-PT" dirty="0"/>
           </a:p>
         </p:txBody>
@@ -5826,32 +7492,70 @@
             <p:ph idx="1"/>
           </p:nvPr>
         </p:nvSpPr>
-        <p:spPr/>
-        <p:txBody>
-          <a:bodyPr/>
+        <p:spPr>
+          <a:xfrm>
+            <a:off x="663879" y="1845734"/>
+            <a:ext cx="10491801" cy="4023360"/>
+          </a:xfrm>
+        </p:spPr>
+        <p:txBody>
+          <a:bodyPr>
+            <a:normAutofit/>
+          </a:bodyPr>
           <a:lstStyle/>
           <a:p>
-            <a:endParaRPr lang="pt-PT"/>
+            <a:pPr lvl="0" algn="just" fontAlgn="base">
+              <a:buFont typeface="Wingdings" charset="2"/>
+              <a:buChar char="§"/>
+            </a:pPr>
+            <a:r>
+              <a:rPr lang="pt-PT" dirty="0"/>
+              <a:t>Permitir ao utilizador efetuar registo e autenticação na aplicação, o que permitirá que este faça o registo das suas preferências (ou não preferências), que poderão influenciar as apresentações de sugestões futuras, assim como permitirá armazenar o histórico dos locais já frequentados (sugeridos pela aplicação), que poderá ser revisto e possibilitar o utilizador de escolher novamente um desses locais; </a:t>
+            </a:r>
+          </a:p>
+          <a:p>
+            <a:pPr lvl="0" algn="just" fontAlgn="base">
+              <a:buFont typeface="Wingdings" charset="2"/>
+              <a:buChar char="§"/>
+            </a:pPr>
+            <a:r>
+              <a:rPr lang="pt-PT" dirty="0"/>
+              <a:t>Apresentar uma lista de tendências de degustação na zona onde o utilizador se encontra; </a:t>
+            </a:r>
+            <a:endParaRPr lang="pt-PT" dirty="0" smtClean="0"/>
+          </a:p>
+          <a:p>
+            <a:pPr lvl="0" algn="just" fontAlgn="base">
+              <a:buFont typeface="Wingdings" charset="2"/>
+              <a:buChar char="§"/>
+            </a:pPr>
+            <a:endParaRPr lang="pt-PT" dirty="0"/>
+          </a:p>
+          <a:p>
+            <a:pPr lvl="0" algn="just" fontAlgn="base">
+              <a:buFont typeface="Wingdings" charset="2"/>
+              <a:buChar char="§"/>
+            </a:pPr>
+            <a:r>
+              <a:rPr lang="pt-PT" dirty="0"/>
+              <a:t>Usar o assistente operacional da plataforma onde está instalado para complementar, se necessário, as suas sugestões.</a:t>
+            </a:r>
+          </a:p>
+          <a:p>
+            <a:endParaRPr lang="pt-PT" dirty="0"/>
           </a:p>
         </p:txBody>
       </p:sp>
     </p:spTree>
     <p:extLst>
       <p:ext uri="{BB962C8B-B14F-4D97-AF65-F5344CB8AC3E}">
-        <p14:creationId xmlns:p14="http://schemas.microsoft.com/office/powerpoint/2010/main" val="482831287"/>
+        <p14:creationId xmlns:p14="http://schemas.microsoft.com/office/powerpoint/2010/main" val="587104373"/>
       </p:ext>
     </p:extLst>
   </p:cSld>
   <p:clrMapOvr>
     <a:masterClrMapping/>
   </p:clrMapOvr>
-  <p:timing>
-    <p:tnLst>
-      <p:par>
-        <p:cTn id="1" dur="indefinite" restart="never" nodeType="tmRoot"/>
-      </p:par>
-    </p:tnLst>
-  </p:timing>
 </p:sld>
 </file>
 
@@ -5889,7 +7593,7 @@
           <a:p>
             <a:r>
               <a:rPr lang="pt-PT" b="1" dirty="0"/>
-              <a:t>Utilidade do sistema</a:t>
+              <a:t>Motivação e objetivos</a:t>
             </a:r>
             <a:r>
               <a:rPr lang="pt-PT" dirty="0"/>
@@ -5917,14 +7621,20 @@
           <a:bodyPr/>
           <a:lstStyle/>
           <a:p>
-            <a:endParaRPr lang="pt-PT"/>
+            <a:r>
+              <a:rPr lang="pt-PT" dirty="0"/>
+              <a:t>O motivo que nos levou à realização deste projeto consistiu no facto de inesperadamente nos apetecer comer algo e não saber onde. Daí que surgiram as seguintes perguntas: “Quantas vezes, inesperadamente, lhe apeteceu comer "algo" específico? Quantas vezes teve curiosidade sobre a gastronomia de uma determinada região?” De forma a melhorar a experiência e qualidade de degustação dos utilizadores, temos como objetivo o desenvolvimento de software capaz de auxiliar e incentivar os mesmos a satisfazer os seus desejos. Desde um simples pastel de nata até uma deliciosa francesinha, esta ferramenta será capaz de sugerir o melhor local, com mais qualidade, com localização mais próxima, ou com o preço mais baixo.</a:t>
+            </a:r>
+          </a:p>
+          <a:p>
+            <a:endParaRPr lang="pt-PT" dirty="0"/>
           </a:p>
         </p:txBody>
       </p:sp>
     </p:spTree>
     <p:extLst>
       <p:ext uri="{BB962C8B-B14F-4D97-AF65-F5344CB8AC3E}">
-        <p14:creationId xmlns:p14="http://schemas.microsoft.com/office/powerpoint/2010/main" val="1752222243"/>
+        <p14:creationId xmlns:p14="http://schemas.microsoft.com/office/powerpoint/2010/main" val="795367"/>
       </p:ext>
     </p:extLst>
   </p:cSld>
@@ -5970,46 +7680,76 @@
         </p:nvSpPr>
         <p:spPr/>
         <p:txBody>
-          <a:bodyPr>
-            <a:normAutofit/>
-          </a:bodyPr>
-          <a:lstStyle/>
-          <a:p>
-            <a:r>
-              <a:rPr lang="pt-PT" b="1" dirty="0"/>
-              <a:t>Estabelecimento da identidade do </a:t>
-            </a:r>
-            <a:r>
-              <a:rPr lang="pt-PT" b="1" dirty="0" smtClean="0"/>
-              <a:t>projeto</a:t>
-            </a:r>
-            <a:endParaRPr lang="pt-PT" b="1" dirty="0"/>
-          </a:p>
-        </p:txBody>
-      </p:sp>
-      <p:sp>
-        <p:nvSpPr>
-          <p:cNvPr id="3" name="Marcador de Posição de Conteúdo 2"/>
-          <p:cNvSpPr>
-            <a:spLocks noGrp="1"/>
-          </p:cNvSpPr>
-          <p:nvPr>
-            <p:ph idx="1"/>
-          </p:nvPr>
-        </p:nvSpPr>
-        <p:spPr/>
-        <p:txBody>
           <a:bodyPr/>
           <a:lstStyle/>
           <a:p>
-            <a:endParaRPr lang="pt-PT"/>
+            <a:r>
+              <a:rPr lang="pt-PT" b="1" dirty="0"/>
+              <a:t>Justificação do sistema</a:t>
+            </a:r>
+            <a:r>
+              <a:rPr lang="pt-PT" dirty="0"/>
+              <a:t/>
+            </a:r>
+            <a:br>
+              <a:rPr lang="pt-PT" dirty="0"/>
+            </a:br>
+            <a:endParaRPr lang="pt-PT" dirty="0"/>
+          </a:p>
+        </p:txBody>
+      </p:sp>
+      <p:sp>
+        <p:nvSpPr>
+          <p:cNvPr id="3" name="Marcador de Posição de Conteúdo 2"/>
+          <p:cNvSpPr>
+            <a:spLocks noGrp="1"/>
+          </p:cNvSpPr>
+          <p:nvPr>
+            <p:ph idx="1"/>
+          </p:nvPr>
+        </p:nvSpPr>
+        <p:spPr/>
+        <p:txBody>
+          <a:bodyPr/>
+          <a:lstStyle/>
+          <a:p>
+            <a:r>
+              <a:rPr lang="pt-PT" dirty="0"/>
+              <a:t>Todos os dias surgem novas aplicações capazes de responder </a:t>
+            </a:r>
+            <a:r>
+              <a:rPr lang="pt-PT" dirty="0" smtClean="0"/>
+              <a:t>às </a:t>
+            </a:r>
+            <a:r>
+              <a:rPr lang="pt-PT" dirty="0"/>
+              <a:t>nossas necessidades e interesses. </a:t>
+            </a:r>
+            <a:r>
+              <a:rPr lang="pt-PT" dirty="0"/>
+              <a:t>E</a:t>
+            </a:r>
+            <a:r>
+              <a:rPr lang="pt-PT" dirty="0" smtClean="0"/>
+              <a:t>ste </a:t>
+            </a:r>
+            <a:r>
+              <a:rPr lang="pt-PT" dirty="0"/>
+              <a:t>sistema de recomendação e localização irá melhorar a qualidade de vida dos seus utilizadores, auxiliando os mesmos a satisfazer o seu apetite, a qualquer momento. Sem perder muito tempo com pesquisas em diferentes sites de restaurantes, ou aplicações que só indicam quais os melhores restaurantes da zona, estes que por vezes não indicam o tipo de comida que fazem. </a:t>
+            </a:r>
+          </a:p>
+          <a:p>
+            <a:endParaRPr lang="pt-PT" dirty="0"/>
+          </a:p>
+          <a:p>
+            <a:endParaRPr lang="pt-PT" dirty="0"/>
           </a:p>
         </p:txBody>
       </p:sp>
     </p:spTree>
     <p:extLst>
       <p:ext uri="{BB962C8B-B14F-4D97-AF65-F5344CB8AC3E}">
-        <p14:creationId xmlns:p14="http://schemas.microsoft.com/office/powerpoint/2010/main" val="1155986790"/>
+        <p14:creationId xmlns:p14="http://schemas.microsoft.com/office/powerpoint/2010/main" val="482831287"/>
       </p:ext>
     </p:extLst>
   </p:cSld>
@@ -6060,7 +7800,7 @@
           <a:p>
             <a:r>
               <a:rPr lang="pt-PT" b="1" dirty="0"/>
-              <a:t>Maqueta do sistema</a:t>
+              <a:t>Utilidade do sistema</a:t>
             </a:r>
             <a:r>
               <a:rPr lang="pt-PT" dirty="0"/>
@@ -6088,14 +7828,34 @@
           <a:bodyPr/>
           <a:lstStyle/>
           <a:p>
-            <a:endParaRPr lang="pt-PT"/>
+            <a:endParaRPr lang="pt-PT" dirty="0" smtClean="0"/>
+          </a:p>
+          <a:p>
+            <a:r>
+              <a:rPr lang="pt-PT" dirty="0" smtClean="0"/>
+              <a:t>O </a:t>
+            </a:r>
+            <a:r>
+              <a:rPr lang="pt-PT" dirty="0"/>
+              <a:t>sistema irá permitir que o utilizador encontre o local onde poderá satisfazer o seu apetite, de forma mais rápida, de maneira a melhorar o seu dia a dia, tornando a sua procura mais eficiente. O utilizador também não terá a preocupação de como chegar ao seu destino, pois será função do sistema mostrar o caminho num mapa</a:t>
+            </a:r>
+            <a:r>
+              <a:rPr lang="pt-PT" dirty="0" smtClean="0"/>
+              <a:t>.</a:t>
+            </a:r>
+          </a:p>
+          <a:p>
+            <a:endParaRPr lang="pt-PT" dirty="0"/>
+          </a:p>
+          <a:p>
+            <a:endParaRPr lang="pt-PT" dirty="0"/>
           </a:p>
         </p:txBody>
       </p:sp>
     </p:spTree>
     <p:extLst>
       <p:ext uri="{BB962C8B-B14F-4D97-AF65-F5344CB8AC3E}">
-        <p14:creationId xmlns:p14="http://schemas.microsoft.com/office/powerpoint/2010/main" val="385425121"/>
+        <p14:creationId xmlns:p14="http://schemas.microsoft.com/office/powerpoint/2010/main" val="1752222243"/>
       </p:ext>
     </p:extLst>
   </p:cSld>
@@ -6148,11 +7908,11 @@
           <a:p>
             <a:r>
               <a:rPr lang="pt-PT" b="1" dirty="0"/>
-              <a:t>Definição de um conjunto de medidas de </a:t>
+              <a:t>Estabelecimento da identidade do </a:t>
             </a:r>
             <a:r>
               <a:rPr lang="pt-PT" b="1" dirty="0" smtClean="0"/>
-              <a:t>sucesso</a:t>
+              <a:t>projeto</a:t>
             </a:r>
             <a:endParaRPr lang="pt-PT" b="1" dirty="0"/>
           </a:p>
@@ -6170,17 +7930,76 @@
         </p:nvSpPr>
         <p:spPr/>
         <p:txBody>
-          <a:bodyPr/>
+          <a:bodyPr>
+            <a:normAutofit/>
+          </a:bodyPr>
           <a:lstStyle/>
           <a:p>
-            <a:endParaRPr lang="pt-PT"/>
+            <a:r>
+              <a:rPr lang="pt-PT" dirty="0" smtClean="0"/>
+              <a:t> </a:t>
+            </a:r>
+          </a:p>
+          <a:p>
+            <a:r>
+              <a:rPr lang="pt-PT" dirty="0" smtClean="0"/>
+              <a:t>A </a:t>
+            </a:r>
+            <a:r>
+              <a:rPr lang="pt-PT" dirty="0"/>
+              <a:t>ideia do projeto é desenvolver um sistema capaz de ajudar o utilizador a encontrar um local onde possa degustar o que lhe estiver a apetecer no momento, de acordo com a sua localização atual, de forma a que o local sugerido para a degustação seja o mais rápido de alcançar, ofereça o melhor preço ou sirva o produto com mais qualidade</a:t>
+            </a:r>
+            <a:r>
+              <a:rPr lang="pt-PT" dirty="0" smtClean="0"/>
+              <a:t>.</a:t>
+            </a:r>
+          </a:p>
+          <a:p>
+            <a:endParaRPr lang="pt-PT" dirty="0"/>
+          </a:p>
+          <a:p>
+            <a:r>
+              <a:rPr lang="pt-PT" dirty="0"/>
+              <a:t>Descrevendo mais detalhadamente a </a:t>
+            </a:r>
+            <a:r>
+              <a:rPr lang="pt-PT" i="1" dirty="0" err="1" smtClean="0"/>
+              <a:t>app</a:t>
+            </a:r>
+            <a:r>
+              <a:rPr lang="pt-PT" i="1" dirty="0" smtClean="0"/>
+              <a:t> permite a</a:t>
+            </a:r>
+            <a:r>
+              <a:rPr lang="pt-PT" dirty="0" smtClean="0"/>
+              <a:t>o </a:t>
+            </a:r>
+            <a:r>
+              <a:rPr lang="pt-PT" dirty="0"/>
+              <a:t>utilizador através de texto ou de um comando de voz </a:t>
+            </a:r>
+            <a:r>
+              <a:rPr lang="pt-PT" dirty="0" smtClean="0"/>
+              <a:t>explicitar </a:t>
+            </a:r>
+            <a:r>
+              <a:rPr lang="pt-PT" dirty="0"/>
+              <a:t>o seu pedido. A aplicação apresentar-lhe-á os estabelecimentos onde se encontra o produto que o utilizador pretende ordenado pela maneira que o utilizador desejar. </a:t>
+            </a:r>
+            <a:endParaRPr lang="pt-PT" dirty="0" smtClean="0"/>
+          </a:p>
+          <a:p>
+            <a:endParaRPr lang="pt-PT" dirty="0"/>
+          </a:p>
+          <a:p>
+            <a:endParaRPr lang="pt-PT" dirty="0"/>
           </a:p>
         </p:txBody>
       </p:sp>
     </p:spTree>
     <p:extLst>
       <p:ext uri="{BB962C8B-B14F-4D97-AF65-F5344CB8AC3E}">
-        <p14:creationId xmlns:p14="http://schemas.microsoft.com/office/powerpoint/2010/main" val="1029329295"/>
+        <p14:creationId xmlns:p14="http://schemas.microsoft.com/office/powerpoint/2010/main" val="1155986790"/>
       </p:ext>
     </p:extLst>
   </p:cSld>

</xml_diff>